<commit_message>
updated slides with annotations and oil sensors
</commit_message>
<xml_diff>
--- a/engineSetupPrelim.pptx
+++ b/engineSetupPrelim.pptx
@@ -13,10 +13,11 @@
     <p:sldId id="260" r:id="rId7"/>
     <p:sldId id="261" r:id="rId8"/>
     <p:sldId id="262" r:id="rId9"/>
-    <p:sldId id="266" r:id="rId10"/>
-    <p:sldId id="264" r:id="rId11"/>
+    <p:sldId id="264" r:id="rId10"/>
+    <p:sldId id="266" r:id="rId11"/>
     <p:sldId id="265" r:id="rId12"/>
     <p:sldId id="267" r:id="rId13"/>
+    <p:sldId id="269" r:id="rId14"/>
   </p:sldIdLst>
   <p:sldSz cx="12192000" cy="6858000"/>
   <p:notesSz cx="6858000" cy="9144000"/>
@@ -123,6 +124,18 @@
 </p:presentation>
 </file>
 
+<file path=ppt/commentAuthors.xml><?xml version="1.0" encoding="utf-8"?>
+<p:cmAuthorLst xmlns:a="http://schemas.openxmlformats.org/drawingml/2006/main" xmlns:r="http://schemas.openxmlformats.org/officeDocument/2006/relationships" xmlns:p="http://schemas.openxmlformats.org/presentationml/2006/main">
+  <p:cmAuthor id="1" name="Timothy Darrah" initials="TD" lastIdx="1" clrIdx="0">
+    <p:extLst>
+      <p:ext uri="{19B8F6BF-5375-455C-9EA6-DF929625EA0E}">
+        <p15:presenceInfo xmlns:p15="http://schemas.microsoft.com/office/powerpoint/2012/main" userId="Timothy Darrah" providerId="None"/>
+      </p:ext>
+    </p:extLst>
+  </p:cmAuthor>
+</p:cmAuthorLst>
+</file>
+
 <file path=ppt/slideLayouts/slideLayout1.xml><?xml version="1.0" encoding="utf-8"?>
 <p:sldLayout xmlns:a="http://schemas.openxmlformats.org/drawingml/2006/main" xmlns:r="http://schemas.openxmlformats.org/officeDocument/2006/relationships" xmlns:p="http://schemas.openxmlformats.org/presentationml/2006/main" type="title" preserve="1">
   <p:cSld name="Title Slide">
@@ -270,7 +283,7 @@
           <a:p>
             <a:fld id="{72E9B968-B903-4D6A-B7CC-6372C0F4AA21}" type="datetimeFigureOut">
               <a:rPr lang="en-US" smtClean="0"/>
-              <a:t>5/10/2019</a:t>
+              <a:t>5/12/2019</a:t>
             </a:fld>
             <a:endParaRPr lang="en-US"/>
           </a:p>
@@ -468,7 +481,7 @@
           <a:p>
             <a:fld id="{72E9B968-B903-4D6A-B7CC-6372C0F4AA21}" type="datetimeFigureOut">
               <a:rPr lang="en-US" smtClean="0"/>
-              <a:t>5/10/2019</a:t>
+              <a:t>5/12/2019</a:t>
             </a:fld>
             <a:endParaRPr lang="en-US"/>
           </a:p>
@@ -676,7 +689,7 @@
           <a:p>
             <a:fld id="{72E9B968-B903-4D6A-B7CC-6372C0F4AA21}" type="datetimeFigureOut">
               <a:rPr lang="en-US" smtClean="0"/>
-              <a:t>5/10/2019</a:t>
+              <a:t>5/12/2019</a:t>
             </a:fld>
             <a:endParaRPr lang="en-US"/>
           </a:p>
@@ -874,7 +887,7 @@
           <a:p>
             <a:fld id="{72E9B968-B903-4D6A-B7CC-6372C0F4AA21}" type="datetimeFigureOut">
               <a:rPr lang="en-US" smtClean="0"/>
-              <a:t>5/10/2019</a:t>
+              <a:t>5/12/2019</a:t>
             </a:fld>
             <a:endParaRPr lang="en-US"/>
           </a:p>
@@ -1149,7 +1162,7 @@
           <a:p>
             <a:fld id="{72E9B968-B903-4D6A-B7CC-6372C0F4AA21}" type="datetimeFigureOut">
               <a:rPr lang="en-US" smtClean="0"/>
-              <a:t>5/10/2019</a:t>
+              <a:t>5/12/2019</a:t>
             </a:fld>
             <a:endParaRPr lang="en-US"/>
           </a:p>
@@ -1414,7 +1427,7 @@
           <a:p>
             <a:fld id="{72E9B968-B903-4D6A-B7CC-6372C0F4AA21}" type="datetimeFigureOut">
               <a:rPr lang="en-US" smtClean="0"/>
-              <a:t>5/10/2019</a:t>
+              <a:t>5/12/2019</a:t>
             </a:fld>
             <a:endParaRPr lang="en-US"/>
           </a:p>
@@ -1826,7 +1839,7 @@
           <a:p>
             <a:fld id="{72E9B968-B903-4D6A-B7CC-6372C0F4AA21}" type="datetimeFigureOut">
               <a:rPr lang="en-US" smtClean="0"/>
-              <a:t>5/10/2019</a:t>
+              <a:t>5/12/2019</a:t>
             </a:fld>
             <a:endParaRPr lang="en-US"/>
           </a:p>
@@ -1967,7 +1980,7 @@
           <a:p>
             <a:fld id="{72E9B968-B903-4D6A-B7CC-6372C0F4AA21}" type="datetimeFigureOut">
               <a:rPr lang="en-US" smtClean="0"/>
-              <a:t>5/10/2019</a:t>
+              <a:t>5/12/2019</a:t>
             </a:fld>
             <a:endParaRPr lang="en-US"/>
           </a:p>
@@ -2080,7 +2093,7 @@
           <a:p>
             <a:fld id="{72E9B968-B903-4D6A-B7CC-6372C0F4AA21}" type="datetimeFigureOut">
               <a:rPr lang="en-US" smtClean="0"/>
-              <a:t>5/10/2019</a:t>
+              <a:t>5/12/2019</a:t>
             </a:fld>
             <a:endParaRPr lang="en-US"/>
           </a:p>
@@ -2391,7 +2404,7 @@
           <a:p>
             <a:fld id="{72E9B968-B903-4D6A-B7CC-6372C0F4AA21}" type="datetimeFigureOut">
               <a:rPr lang="en-US" smtClean="0"/>
-              <a:t>5/10/2019</a:t>
+              <a:t>5/12/2019</a:t>
             </a:fld>
             <a:endParaRPr lang="en-US"/>
           </a:p>
@@ -2679,7 +2692,7 @@
           <a:p>
             <a:fld id="{72E9B968-B903-4D6A-B7CC-6372C0F4AA21}" type="datetimeFigureOut">
               <a:rPr lang="en-US" smtClean="0"/>
-              <a:t>5/10/2019</a:t>
+              <a:t>5/12/2019</a:t>
             </a:fld>
             <a:endParaRPr lang="en-US"/>
           </a:p>
@@ -2920,7 +2933,7 @@
           <a:p>
             <a:fld id="{72E9B968-B903-4D6A-B7CC-6372C0F4AA21}" type="datetimeFigureOut">
               <a:rPr lang="en-US" smtClean="0"/>
-              <a:t>5/10/2019</a:t>
+              <a:t>5/12/2019</a:t>
             </a:fld>
             <a:endParaRPr lang="en-US"/>
           </a:p>
@@ -3431,7 +3444,7 @@
           <p:cNvPr id="2" name="Picture 1">
             <a:extLst>
               <a:ext uri="{FF2B5EF4-FFF2-40B4-BE49-F238E27FC236}">
-                <a16:creationId xmlns:a16="http://schemas.microsoft.com/office/drawing/2014/main" id="{52B0C0E9-AF05-4A71-BE88-640B98519621}"/>
+                <a16:creationId xmlns:a16="http://schemas.microsoft.com/office/drawing/2014/main" id="{C0616BAD-69B8-4A81-A044-FF848CDA8BF8}"/>
               </a:ext>
             </a:extLst>
           </p:cNvPr>
@@ -3448,20 +3461,95 @@
         </p:blipFill>
         <p:spPr>
           <a:xfrm>
-            <a:off x="85512" y="1148987"/>
-            <a:ext cx="3970120" cy="3180767"/>
+            <a:off x="4671332" y="1254397"/>
+            <a:ext cx="6423388" cy="4741453"/>
           </a:xfrm>
           <a:prstGeom prst="rect">
             <a:avLst/>
           </a:prstGeom>
         </p:spPr>
       </p:pic>
+      <p:sp>
+        <p:nvSpPr>
+          <p:cNvPr id="3" name="TextBox 2">
+            <a:extLst>
+              <a:ext uri="{FF2B5EF4-FFF2-40B4-BE49-F238E27FC236}">
+                <a16:creationId xmlns:a16="http://schemas.microsoft.com/office/drawing/2014/main" id="{4ADE2AF3-5EFB-4DBC-9F22-312CD2D6576B}"/>
+              </a:ext>
+            </a:extLst>
+          </p:cNvPr>
+          <p:cNvSpPr txBox="1"/>
+          <p:nvPr/>
+        </p:nvSpPr>
+        <p:spPr>
+          <a:xfrm>
+            <a:off x="585628" y="256853"/>
+            <a:ext cx="6863136" cy="830997"/>
+          </a:xfrm>
+          <a:prstGeom prst="rect">
+            <a:avLst/>
+          </a:prstGeom>
+          <a:noFill/>
+        </p:spPr>
+        <p:txBody>
+          <a:bodyPr wrap="square" rtlCol="0">
+            <a:spAutoFit/>
+          </a:bodyPr>
+          <a:lstStyle/>
+          <a:p>
+            <a:r>
+              <a:rPr lang="en-US" sz="4800" dirty="0"/>
+              <a:t>Vibration FFT</a:t>
+            </a:r>
+          </a:p>
+        </p:txBody>
+      </p:sp>
+      <p:sp>
+        <p:nvSpPr>
+          <p:cNvPr id="4" name="TextBox 3">
+            <a:extLst>
+              <a:ext uri="{FF2B5EF4-FFF2-40B4-BE49-F238E27FC236}">
+                <a16:creationId xmlns:a16="http://schemas.microsoft.com/office/drawing/2014/main" id="{ADB6745C-BFBD-45F0-8083-A95E5F07FF32}"/>
+              </a:ext>
+            </a:extLst>
+          </p:cNvPr>
+          <p:cNvSpPr txBox="1"/>
+          <p:nvPr/>
+        </p:nvSpPr>
+        <p:spPr>
+          <a:xfrm>
+            <a:off x="339634" y="1611086"/>
+            <a:ext cx="3274423" cy="923330"/>
+          </a:xfrm>
+          <a:prstGeom prst="rect">
+            <a:avLst/>
+          </a:prstGeom>
+          <a:solidFill>
+            <a:schemeClr val="accent2">
+              <a:lumMod val="60000"/>
+              <a:lumOff val="40000"/>
+            </a:schemeClr>
+          </a:solidFill>
+        </p:spPr>
+        <p:txBody>
+          <a:bodyPr wrap="square" rtlCol="0">
+            <a:spAutoFit/>
+          </a:bodyPr>
+          <a:lstStyle/>
+          <a:p>
+            <a:r>
+              <a:rPr lang="en-US" dirty="0"/>
+              <a:t>Discuss the differences of the FFT and power spectrum – they are both based on the FFT</a:t>
+            </a:r>
+          </a:p>
+        </p:txBody>
+      </p:sp>
       <p:pic>
         <p:nvPicPr>
-          <p:cNvPr id="3" name="Picture 2">
-            <a:extLst>
-              <a:ext uri="{FF2B5EF4-FFF2-40B4-BE49-F238E27FC236}">
-                <a16:creationId xmlns:a16="http://schemas.microsoft.com/office/drawing/2014/main" id="{A6019D48-315D-4119-B7C0-DEA59E3CA373}"/>
+          <p:cNvPr id="5" name="Picture 4">
+            <a:extLst>
+              <a:ext uri="{FF2B5EF4-FFF2-40B4-BE49-F238E27FC236}">
+                <a16:creationId xmlns:a16="http://schemas.microsoft.com/office/drawing/2014/main" id="{4838AD7F-7CCC-42A7-B838-C9CC7F94DE69}"/>
               </a:ext>
             </a:extLst>
           </p:cNvPr>
@@ -3478,48 +3566,32 @@
         </p:blipFill>
         <p:spPr>
           <a:xfrm>
-            <a:off x="3962401" y="1158985"/>
-            <a:ext cx="3886047" cy="3166755"/>
-          </a:xfrm>
-          <a:prstGeom prst="rect">
-            <a:avLst/>
-          </a:prstGeom>
-        </p:spPr>
-      </p:pic>
-      <p:pic>
-        <p:nvPicPr>
-          <p:cNvPr id="4" name="Picture 3">
-            <a:extLst>
-              <a:ext uri="{FF2B5EF4-FFF2-40B4-BE49-F238E27FC236}">
-                <a16:creationId xmlns:a16="http://schemas.microsoft.com/office/drawing/2014/main" id="{93A91D63-BFFF-4DD5-B98D-550F7CCE1BA6}"/>
-              </a:ext>
-            </a:extLst>
-          </p:cNvPr>
-          <p:cNvPicPr>
-            <a:picLocks noChangeAspect="1"/>
-          </p:cNvPicPr>
-          <p:nvPr/>
-        </p:nvPicPr>
-        <p:blipFill>
-          <a:blip r:embed="rId4"/>
-          <a:stretch>
-            <a:fillRect/>
-          </a:stretch>
-        </p:blipFill>
-        <p:spPr>
-          <a:xfrm>
-            <a:off x="7816226" y="1179993"/>
-            <a:ext cx="3834669" cy="3190108"/>
-          </a:xfrm>
-          <a:prstGeom prst="rect">
-            <a:avLst/>
-          </a:prstGeom>
+            <a:off x="651646" y="4394426"/>
+            <a:ext cx="3590925" cy="333375"/>
+          </a:xfrm>
+          <a:prstGeom prst="rect">
+            <a:avLst/>
+          </a:prstGeom>
+          <a:ln w="38100" cap="sq">
+            <a:solidFill>
+              <a:srgbClr val="000000"/>
+            </a:solidFill>
+            <a:prstDash val="solid"/>
+            <a:miter lim="800000"/>
+          </a:ln>
+          <a:effectLst>
+            <a:outerShdw blurRad="50800" dist="38100" dir="2700000" algn="tl" rotWithShape="0">
+              <a:srgbClr val="000000">
+                <a:alpha val="43000"/>
+              </a:srgbClr>
+            </a:outerShdw>
+          </a:effectLst>
         </p:spPr>
       </p:pic>
     </p:spTree>
     <p:extLst>
       <p:ext uri="{BB962C8B-B14F-4D97-AF65-F5344CB8AC3E}">
-        <p14:creationId xmlns:p14="http://schemas.microsoft.com/office/powerpoint/2010/main" val="2861383383"/>
+        <p14:creationId xmlns:p14="http://schemas.microsoft.com/office/powerpoint/2010/main" val="640113560"/>
       </p:ext>
     </p:extLst>
   </p:cSld>
@@ -3636,6 +3708,311 @@
           </a:prstGeom>
         </p:spPr>
       </p:pic>
+      <p:sp>
+        <p:nvSpPr>
+          <p:cNvPr id="5" name="TextBox 4">
+            <a:extLst>
+              <a:ext uri="{FF2B5EF4-FFF2-40B4-BE49-F238E27FC236}">
+                <a16:creationId xmlns:a16="http://schemas.microsoft.com/office/drawing/2014/main" id="{F0E8DC91-25E6-4ED5-B94D-235ADC82DD1F}"/>
+              </a:ext>
+            </a:extLst>
+          </p:cNvPr>
+          <p:cNvSpPr txBox="1"/>
+          <p:nvPr/>
+        </p:nvSpPr>
+        <p:spPr>
+          <a:xfrm>
+            <a:off x="9596846" y="4162700"/>
+            <a:ext cx="1950720" cy="369332"/>
+          </a:xfrm>
+          <a:prstGeom prst="rect">
+            <a:avLst/>
+          </a:prstGeom>
+          <a:noFill/>
+        </p:spPr>
+        <p:txBody>
+          <a:bodyPr wrap="square" rtlCol="0">
+            <a:spAutoFit/>
+          </a:bodyPr>
+          <a:lstStyle/>
+          <a:p>
+            <a:pPr algn="ctr"/>
+            <a:r>
+              <a:rPr lang="en-US" dirty="0"/>
+              <a:t>But what is this?</a:t>
+            </a:r>
+          </a:p>
+        </p:txBody>
+      </p:sp>
+      <p:sp>
+        <p:nvSpPr>
+          <p:cNvPr id="6" name="Oval 5">
+            <a:extLst>
+              <a:ext uri="{FF2B5EF4-FFF2-40B4-BE49-F238E27FC236}">
+                <a16:creationId xmlns:a16="http://schemas.microsoft.com/office/drawing/2014/main" id="{BB46A891-B73C-4A18-846B-8745616E234B}"/>
+              </a:ext>
+            </a:extLst>
+          </p:cNvPr>
+          <p:cNvSpPr/>
+          <p:nvPr/>
+        </p:nvSpPr>
+        <p:spPr>
+          <a:xfrm>
+            <a:off x="9396549" y="287382"/>
+            <a:ext cx="2577737" cy="2002971"/>
+          </a:xfrm>
+          <a:prstGeom prst="ellipse">
+            <a:avLst/>
+          </a:prstGeom>
+          <a:noFill/>
+          <a:ln w="57150">
+            <a:solidFill>
+              <a:srgbClr val="FF0000"/>
+            </a:solidFill>
+          </a:ln>
+        </p:spPr>
+        <p:style>
+          <a:lnRef idx="2">
+            <a:schemeClr val="accent1">
+              <a:shade val="50000"/>
+            </a:schemeClr>
+          </a:lnRef>
+          <a:fillRef idx="1">
+            <a:schemeClr val="accent1"/>
+          </a:fillRef>
+          <a:effectRef idx="0">
+            <a:schemeClr val="accent1"/>
+          </a:effectRef>
+          <a:fontRef idx="minor">
+            <a:schemeClr val="lt1"/>
+          </a:fontRef>
+        </p:style>
+        <p:txBody>
+          <a:bodyPr rtlCol="0" anchor="ctr"/>
+          <a:lstStyle/>
+          <a:p>
+            <a:pPr algn="ctr"/>
+            <a:endParaRPr lang="en-US"/>
+          </a:p>
+        </p:txBody>
+      </p:sp>
+      <p:sp>
+        <p:nvSpPr>
+          <p:cNvPr id="7" name="Oval 6">
+            <a:extLst>
+              <a:ext uri="{FF2B5EF4-FFF2-40B4-BE49-F238E27FC236}">
+                <a16:creationId xmlns:a16="http://schemas.microsoft.com/office/drawing/2014/main" id="{F1378F38-A20E-47C4-97A6-CA592EB35D53}"/>
+              </a:ext>
+            </a:extLst>
+          </p:cNvPr>
+          <p:cNvSpPr/>
+          <p:nvPr/>
+        </p:nvSpPr>
+        <p:spPr>
+          <a:xfrm>
+            <a:off x="2216331" y="1872342"/>
+            <a:ext cx="3618411" cy="1310639"/>
+          </a:xfrm>
+          <a:prstGeom prst="ellipse">
+            <a:avLst/>
+          </a:prstGeom>
+          <a:noFill/>
+          <a:ln w="57150">
+            <a:solidFill>
+              <a:srgbClr val="FF0000"/>
+            </a:solidFill>
+          </a:ln>
+        </p:spPr>
+        <p:style>
+          <a:lnRef idx="2">
+            <a:schemeClr val="accent1">
+              <a:shade val="50000"/>
+            </a:schemeClr>
+          </a:lnRef>
+          <a:fillRef idx="1">
+            <a:schemeClr val="accent1"/>
+          </a:fillRef>
+          <a:effectRef idx="0">
+            <a:schemeClr val="accent1"/>
+          </a:effectRef>
+          <a:fontRef idx="minor">
+            <a:schemeClr val="lt1"/>
+          </a:fontRef>
+        </p:style>
+        <p:txBody>
+          <a:bodyPr rtlCol="0" anchor="ctr"/>
+          <a:lstStyle/>
+          <a:p>
+            <a:pPr algn="ctr"/>
+            <a:endParaRPr lang="en-US"/>
+          </a:p>
+        </p:txBody>
+      </p:sp>
+      <p:cxnSp>
+        <p:nvCxnSpPr>
+          <p:cNvPr id="8" name="Straight Arrow Connector 7">
+            <a:extLst>
+              <a:ext uri="{FF2B5EF4-FFF2-40B4-BE49-F238E27FC236}">
+                <a16:creationId xmlns:a16="http://schemas.microsoft.com/office/drawing/2014/main" id="{117D411F-9066-4D0D-9970-1C454D07E11B}"/>
+              </a:ext>
+            </a:extLst>
+          </p:cNvPr>
+          <p:cNvCxnSpPr>
+            <a:cxnSpLocks/>
+          </p:cNvCxnSpPr>
+          <p:nvPr/>
+        </p:nvCxnSpPr>
+        <p:spPr>
+          <a:xfrm flipV="1">
+            <a:off x="1341120" y="3108960"/>
+            <a:ext cx="1332411" cy="1306285"/>
+          </a:xfrm>
+          <a:prstGeom prst="straightConnector1">
+            <a:avLst/>
+          </a:prstGeom>
+          <a:ln w="57150">
+            <a:solidFill>
+              <a:srgbClr val="FF0000"/>
+            </a:solidFill>
+            <a:tailEnd type="triangle"/>
+          </a:ln>
+        </p:spPr>
+        <p:style>
+          <a:lnRef idx="1">
+            <a:schemeClr val="accent1"/>
+          </a:lnRef>
+          <a:fillRef idx="0">
+            <a:schemeClr val="accent1"/>
+          </a:fillRef>
+          <a:effectRef idx="0">
+            <a:schemeClr val="accent1"/>
+          </a:effectRef>
+          <a:fontRef idx="minor">
+            <a:schemeClr val="tx1"/>
+          </a:fontRef>
+        </p:style>
+      </p:cxnSp>
+      <p:cxnSp>
+        <p:nvCxnSpPr>
+          <p:cNvPr id="10" name="Straight Arrow Connector 9">
+            <a:extLst>
+              <a:ext uri="{FF2B5EF4-FFF2-40B4-BE49-F238E27FC236}">
+                <a16:creationId xmlns:a16="http://schemas.microsoft.com/office/drawing/2014/main" id="{2F6EE5DD-4E1A-4F11-A9FE-BD47DC33A130}"/>
+              </a:ext>
+            </a:extLst>
+          </p:cNvPr>
+          <p:cNvCxnSpPr>
+            <a:cxnSpLocks/>
+          </p:cNvCxnSpPr>
+          <p:nvPr/>
+        </p:nvCxnSpPr>
+        <p:spPr>
+          <a:xfrm flipV="1">
+            <a:off x="10768148" y="2451464"/>
+            <a:ext cx="0" cy="1606730"/>
+          </a:xfrm>
+          <a:prstGeom prst="straightConnector1">
+            <a:avLst/>
+          </a:prstGeom>
+          <a:ln w="57150">
+            <a:solidFill>
+              <a:srgbClr val="FF0000"/>
+            </a:solidFill>
+            <a:tailEnd type="triangle"/>
+          </a:ln>
+        </p:spPr>
+        <p:style>
+          <a:lnRef idx="1">
+            <a:schemeClr val="accent1"/>
+          </a:lnRef>
+          <a:fillRef idx="0">
+            <a:schemeClr val="accent1"/>
+          </a:fillRef>
+          <a:effectRef idx="0">
+            <a:schemeClr val="accent1"/>
+          </a:effectRef>
+          <a:fontRef idx="minor">
+            <a:schemeClr val="tx1"/>
+          </a:fontRef>
+        </p:style>
+      </p:cxnSp>
+      <p:sp>
+        <p:nvSpPr>
+          <p:cNvPr id="12" name="TextBox 11">
+            <a:extLst>
+              <a:ext uri="{FF2B5EF4-FFF2-40B4-BE49-F238E27FC236}">
+                <a16:creationId xmlns:a16="http://schemas.microsoft.com/office/drawing/2014/main" id="{A7CB1586-DE9E-41B8-8A56-07EECE8B43D1}"/>
+              </a:ext>
+            </a:extLst>
+          </p:cNvPr>
+          <p:cNvSpPr txBox="1"/>
+          <p:nvPr/>
+        </p:nvSpPr>
+        <p:spPr>
+          <a:xfrm>
+            <a:off x="204652" y="4445729"/>
+            <a:ext cx="1950720" cy="646331"/>
+          </a:xfrm>
+          <a:prstGeom prst="rect">
+            <a:avLst/>
+          </a:prstGeom>
+          <a:noFill/>
+        </p:spPr>
+        <p:txBody>
+          <a:bodyPr wrap="square" rtlCol="0">
+            <a:spAutoFit/>
+          </a:bodyPr>
+          <a:lstStyle/>
+          <a:p>
+            <a:pPr algn="ctr"/>
+            <a:r>
+              <a:rPr lang="en-US" dirty="0"/>
+              <a:t>The 2500hz vibration </a:t>
+            </a:r>
+          </a:p>
+        </p:txBody>
+      </p:sp>
+      <p:sp>
+        <p:nvSpPr>
+          <p:cNvPr id="13" name="TextBox 12">
+            <a:extLst>
+              <a:ext uri="{FF2B5EF4-FFF2-40B4-BE49-F238E27FC236}">
+                <a16:creationId xmlns:a16="http://schemas.microsoft.com/office/drawing/2014/main" id="{E1DFB3C3-7137-4FC4-8B0D-7D8BD0D0EBC6}"/>
+              </a:ext>
+            </a:extLst>
+          </p:cNvPr>
+          <p:cNvSpPr txBox="1"/>
+          <p:nvPr/>
+        </p:nvSpPr>
+        <p:spPr>
+          <a:xfrm>
+            <a:off x="9187543" y="5477695"/>
+            <a:ext cx="2499359" cy="923330"/>
+          </a:xfrm>
+          <a:prstGeom prst="rect">
+            <a:avLst/>
+          </a:prstGeom>
+          <a:solidFill>
+            <a:schemeClr val="accent4">
+              <a:lumMod val="40000"/>
+              <a:lumOff val="60000"/>
+            </a:schemeClr>
+          </a:solidFill>
+        </p:spPr>
+        <p:txBody>
+          <a:bodyPr wrap="square" rtlCol="0">
+            <a:spAutoFit/>
+          </a:bodyPr>
+          <a:lstStyle/>
+          <a:p>
+            <a:pPr algn="ctr"/>
+            <a:r>
+              <a:rPr lang="en-US" dirty="0"/>
+              <a:t>What about a dataset of spectrograms for a DNN to learn?</a:t>
+            </a:r>
+          </a:p>
+        </p:txBody>
+      </p:sp>
     </p:spTree>
     <p:extLst>
       <p:ext uri="{BB962C8B-B14F-4D97-AF65-F5344CB8AC3E}">
@@ -3666,10 +4043,401 @@
           <a:chExt cx="0" cy="0"/>
         </a:xfrm>
       </p:grpSpPr>
+      <p:sp>
+        <p:nvSpPr>
+          <p:cNvPr id="2" name="TextBox 1">
+            <a:extLst>
+              <a:ext uri="{FF2B5EF4-FFF2-40B4-BE49-F238E27FC236}">
+                <a16:creationId xmlns:a16="http://schemas.microsoft.com/office/drawing/2014/main" id="{6C9F7DC7-0FDB-4BCF-B289-5275E48744B2}"/>
+              </a:ext>
+            </a:extLst>
+          </p:cNvPr>
+          <p:cNvSpPr txBox="1"/>
+          <p:nvPr/>
+        </p:nvSpPr>
+        <p:spPr>
+          <a:xfrm>
+            <a:off x="585628" y="256853"/>
+            <a:ext cx="6863136" cy="830997"/>
+          </a:xfrm>
+          <a:prstGeom prst="rect">
+            <a:avLst/>
+          </a:prstGeom>
+          <a:noFill/>
+        </p:spPr>
+        <p:txBody>
+          <a:bodyPr wrap="square" rtlCol="0">
+            <a:spAutoFit/>
+          </a:bodyPr>
+          <a:lstStyle/>
+          <a:p>
+            <a:r>
+              <a:rPr lang="en-US" sz="4800" dirty="0"/>
+              <a:t>Vibration DWT</a:t>
+            </a:r>
+          </a:p>
+        </p:txBody>
+      </p:sp>
     </p:spTree>
     <p:extLst>
       <p:ext uri="{BB962C8B-B14F-4D97-AF65-F5344CB8AC3E}">
         <p14:creationId xmlns:p14="http://schemas.microsoft.com/office/powerpoint/2010/main" val="3038485004"/>
+      </p:ext>
+    </p:extLst>
+  </p:cSld>
+  <p:clrMapOvr>
+    <a:masterClrMapping/>
+  </p:clrMapOvr>
+</p:sld>
+</file>
+
+<file path=ppt/slides/slide13.xml><?xml version="1.0" encoding="utf-8"?>
+<p:sld xmlns:a="http://schemas.openxmlformats.org/drawingml/2006/main" xmlns:r="http://schemas.openxmlformats.org/officeDocument/2006/relationships" xmlns:p="http://schemas.openxmlformats.org/presentationml/2006/main">
+  <p:cSld>
+    <p:spTree>
+      <p:nvGrpSpPr>
+        <p:cNvPr id="1" name=""/>
+        <p:cNvGrpSpPr/>
+        <p:nvPr/>
+      </p:nvGrpSpPr>
+      <p:grpSpPr>
+        <a:xfrm>
+          <a:off x="0" y="0"/>
+          <a:ext cx="0" cy="0"/>
+          <a:chOff x="0" y="0"/>
+          <a:chExt cx="0" cy="0"/>
+        </a:xfrm>
+      </p:grpSpPr>
+      <p:sp>
+        <p:nvSpPr>
+          <p:cNvPr id="5" name="TextBox 4">
+            <a:extLst>
+              <a:ext uri="{FF2B5EF4-FFF2-40B4-BE49-F238E27FC236}">
+                <a16:creationId xmlns:a16="http://schemas.microsoft.com/office/drawing/2014/main" id="{8D52AE36-F57C-43C4-81EF-46645743552D}"/>
+              </a:ext>
+            </a:extLst>
+          </p:cNvPr>
+          <p:cNvSpPr txBox="1"/>
+          <p:nvPr/>
+        </p:nvSpPr>
+        <p:spPr>
+          <a:xfrm>
+            <a:off x="585628" y="256853"/>
+            <a:ext cx="6863136" cy="830997"/>
+          </a:xfrm>
+          <a:prstGeom prst="rect">
+            <a:avLst/>
+          </a:prstGeom>
+          <a:noFill/>
+        </p:spPr>
+        <p:txBody>
+          <a:bodyPr wrap="square" rtlCol="0">
+            <a:spAutoFit/>
+          </a:bodyPr>
+          <a:lstStyle/>
+          <a:p>
+            <a:r>
+              <a:rPr lang="en-US" sz="4800" dirty="0"/>
+              <a:t>Oil Sensor Lineup</a:t>
+            </a:r>
+          </a:p>
+        </p:txBody>
+      </p:sp>
+      <p:sp>
+        <p:nvSpPr>
+          <p:cNvPr id="2" name="TextBox 1">
+            <a:extLst>
+              <a:ext uri="{FF2B5EF4-FFF2-40B4-BE49-F238E27FC236}">
+                <a16:creationId xmlns:a16="http://schemas.microsoft.com/office/drawing/2014/main" id="{ADC80B5B-3FC5-4DDB-B810-73DD45B38263}"/>
+              </a:ext>
+            </a:extLst>
+          </p:cNvPr>
+          <p:cNvSpPr txBox="1"/>
+          <p:nvPr/>
+        </p:nvSpPr>
+        <p:spPr>
+          <a:xfrm>
+            <a:off x="0" y="1637211"/>
+            <a:ext cx="4737463" cy="954107"/>
+          </a:xfrm>
+          <a:prstGeom prst="rect">
+            <a:avLst/>
+          </a:prstGeom>
+          <a:noFill/>
+        </p:spPr>
+        <p:txBody>
+          <a:bodyPr wrap="square" rtlCol="0">
+            <a:spAutoFit/>
+          </a:bodyPr>
+          <a:lstStyle/>
+          <a:p>
+            <a:r>
+              <a:rPr lang="en-US" sz="2800" dirty="0"/>
+              <a:t>RMS Oil Quality Sensor</a:t>
+            </a:r>
+          </a:p>
+          <a:p>
+            <a:pPr marL="285750" indent="-285750">
+              <a:buFontTx/>
+              <a:buChar char="-"/>
+            </a:pPr>
+            <a:endParaRPr lang="en-US" sz="2800" dirty="0"/>
+          </a:p>
+        </p:txBody>
+      </p:sp>
+      <p:pic>
+        <p:nvPicPr>
+          <p:cNvPr id="4" name="Picture 3">
+            <a:extLst>
+              <a:ext uri="{FF2B5EF4-FFF2-40B4-BE49-F238E27FC236}">
+                <a16:creationId xmlns:a16="http://schemas.microsoft.com/office/drawing/2014/main" id="{74748A58-1235-42A9-B642-A25005FD4C7F}"/>
+              </a:ext>
+            </a:extLst>
+          </p:cNvPr>
+          <p:cNvPicPr>
+            <a:picLocks noChangeAspect="1"/>
+          </p:cNvPicPr>
+          <p:nvPr/>
+        </p:nvPicPr>
+        <p:blipFill>
+          <a:blip r:embed="rId2"/>
+          <a:stretch>
+            <a:fillRect/>
+          </a:stretch>
+        </p:blipFill>
+        <p:spPr>
+          <a:xfrm>
+            <a:off x="8814026" y="2275687"/>
+            <a:ext cx="2420031" cy="1917760"/>
+          </a:xfrm>
+          <a:prstGeom prst="rect">
+            <a:avLst/>
+          </a:prstGeom>
+        </p:spPr>
+      </p:pic>
+      <p:pic>
+        <p:nvPicPr>
+          <p:cNvPr id="6" name="Picture 5">
+            <a:extLst>
+              <a:ext uri="{FF2B5EF4-FFF2-40B4-BE49-F238E27FC236}">
+                <a16:creationId xmlns:a16="http://schemas.microsoft.com/office/drawing/2014/main" id="{CE7D59FE-3B94-4792-9087-6EBF0600C06D}"/>
+              </a:ext>
+            </a:extLst>
+          </p:cNvPr>
+          <p:cNvPicPr>
+            <a:picLocks noChangeAspect="1"/>
+          </p:cNvPicPr>
+          <p:nvPr/>
+        </p:nvPicPr>
+        <p:blipFill>
+          <a:blip r:embed="rId3"/>
+          <a:stretch>
+            <a:fillRect/>
+          </a:stretch>
+        </p:blipFill>
+        <p:spPr>
+          <a:xfrm>
+            <a:off x="177709" y="2316479"/>
+            <a:ext cx="3302080" cy="1372689"/>
+          </a:xfrm>
+          <a:prstGeom prst="rect">
+            <a:avLst/>
+          </a:prstGeom>
+        </p:spPr>
+      </p:pic>
+      <p:sp>
+        <p:nvSpPr>
+          <p:cNvPr id="3" name="Rectangle 2">
+            <a:extLst>
+              <a:ext uri="{FF2B5EF4-FFF2-40B4-BE49-F238E27FC236}">
+                <a16:creationId xmlns:a16="http://schemas.microsoft.com/office/drawing/2014/main" id="{53E9E654-D3B5-41FA-A49B-D7491577296A}"/>
+              </a:ext>
+            </a:extLst>
+          </p:cNvPr>
+          <p:cNvSpPr/>
+          <p:nvPr/>
+        </p:nvSpPr>
+        <p:spPr>
+          <a:xfrm>
+            <a:off x="7765825" y="1676791"/>
+            <a:ext cx="4193777" cy="523220"/>
+          </a:xfrm>
+          <a:prstGeom prst="rect">
+            <a:avLst/>
+          </a:prstGeom>
+        </p:spPr>
+        <p:txBody>
+          <a:bodyPr wrap="none">
+            <a:spAutoFit/>
+          </a:bodyPr>
+          <a:lstStyle/>
+          <a:p>
+            <a:r>
+              <a:rPr lang="en-US" sz="2800" dirty="0"/>
+              <a:t>Gill 4212 Oil Debris+ sensor</a:t>
+            </a:r>
+          </a:p>
+        </p:txBody>
+      </p:sp>
+      <p:pic>
+        <p:nvPicPr>
+          <p:cNvPr id="8" name="Picture 7">
+            <a:extLst>
+              <a:ext uri="{FF2B5EF4-FFF2-40B4-BE49-F238E27FC236}">
+                <a16:creationId xmlns:a16="http://schemas.microsoft.com/office/drawing/2014/main" id="{F7EA248B-C432-4C39-A31C-6C6553957D02}"/>
+              </a:ext>
+            </a:extLst>
+          </p:cNvPr>
+          <p:cNvPicPr>
+            <a:picLocks noChangeAspect="1"/>
+          </p:cNvPicPr>
+          <p:nvPr/>
+        </p:nvPicPr>
+        <p:blipFill>
+          <a:blip r:embed="rId4"/>
+          <a:stretch>
+            <a:fillRect/>
+          </a:stretch>
+        </p:blipFill>
+        <p:spPr>
+          <a:xfrm>
+            <a:off x="4152219" y="2246812"/>
+            <a:ext cx="3242573" cy="1697899"/>
+          </a:xfrm>
+          <a:prstGeom prst="rect">
+            <a:avLst/>
+          </a:prstGeom>
+        </p:spPr>
+      </p:pic>
+      <p:sp>
+        <p:nvSpPr>
+          <p:cNvPr id="9" name="TextBox 8">
+            <a:extLst>
+              <a:ext uri="{FF2B5EF4-FFF2-40B4-BE49-F238E27FC236}">
+                <a16:creationId xmlns:a16="http://schemas.microsoft.com/office/drawing/2014/main" id="{B93AC1EC-015B-4796-8757-42651702576E}"/>
+              </a:ext>
+            </a:extLst>
+          </p:cNvPr>
+          <p:cNvSpPr txBox="1"/>
+          <p:nvPr/>
+        </p:nvSpPr>
+        <p:spPr>
+          <a:xfrm>
+            <a:off x="4637316" y="1667691"/>
+            <a:ext cx="3270068" cy="523220"/>
+          </a:xfrm>
+          <a:prstGeom prst="rect">
+            <a:avLst/>
+          </a:prstGeom>
+          <a:noFill/>
+        </p:spPr>
+        <p:txBody>
+          <a:bodyPr wrap="square" rtlCol="0">
+            <a:spAutoFit/>
+          </a:bodyPr>
+          <a:lstStyle/>
+          <a:p>
+            <a:r>
+              <a:rPr lang="en-US" sz="2800" dirty="0"/>
+              <a:t>TAN Delta OQS</a:t>
+            </a:r>
+          </a:p>
+        </p:txBody>
+      </p:sp>
+      <p:pic>
+        <p:nvPicPr>
+          <p:cNvPr id="10" name="Picture 9">
+            <a:extLst>
+              <a:ext uri="{FF2B5EF4-FFF2-40B4-BE49-F238E27FC236}">
+                <a16:creationId xmlns:a16="http://schemas.microsoft.com/office/drawing/2014/main" id="{874059AD-FF19-4801-A12E-9FAC90DDDA39}"/>
+              </a:ext>
+            </a:extLst>
+          </p:cNvPr>
+          <p:cNvPicPr>
+            <a:picLocks noChangeAspect="1"/>
+          </p:cNvPicPr>
+          <p:nvPr/>
+        </p:nvPicPr>
+        <p:blipFill>
+          <a:blip r:embed="rId5"/>
+          <a:stretch>
+            <a:fillRect/>
+          </a:stretch>
+        </p:blipFill>
+        <p:spPr>
+          <a:xfrm>
+            <a:off x="165327" y="4407649"/>
+            <a:ext cx="3326810" cy="784292"/>
+          </a:xfrm>
+          <a:prstGeom prst="rect">
+            <a:avLst/>
+          </a:prstGeom>
+        </p:spPr>
+      </p:pic>
+      <p:pic>
+        <p:nvPicPr>
+          <p:cNvPr id="11" name="Picture 10">
+            <a:extLst>
+              <a:ext uri="{FF2B5EF4-FFF2-40B4-BE49-F238E27FC236}">
+                <a16:creationId xmlns:a16="http://schemas.microsoft.com/office/drawing/2014/main" id="{BDC6D52E-4352-4A3F-A9CD-327FE29F2302}"/>
+              </a:ext>
+            </a:extLst>
+          </p:cNvPr>
+          <p:cNvPicPr>
+            <a:picLocks noChangeAspect="1"/>
+          </p:cNvPicPr>
+          <p:nvPr/>
+        </p:nvPicPr>
+        <p:blipFill>
+          <a:blip r:embed="rId6"/>
+          <a:stretch>
+            <a:fillRect/>
+          </a:stretch>
+        </p:blipFill>
+        <p:spPr>
+          <a:xfrm>
+            <a:off x="3778839" y="4276186"/>
+            <a:ext cx="4050167" cy="1003930"/>
+          </a:xfrm>
+          <a:prstGeom prst="rect">
+            <a:avLst/>
+          </a:prstGeom>
+        </p:spPr>
+      </p:pic>
+      <p:pic>
+        <p:nvPicPr>
+          <p:cNvPr id="12" name="Picture 11">
+            <a:extLst>
+              <a:ext uri="{FF2B5EF4-FFF2-40B4-BE49-F238E27FC236}">
+                <a16:creationId xmlns:a16="http://schemas.microsoft.com/office/drawing/2014/main" id="{CDD7ECC6-DBC5-4D86-AD0D-0D5A14C826BF}"/>
+              </a:ext>
+            </a:extLst>
+          </p:cNvPr>
+          <p:cNvPicPr>
+            <a:picLocks noChangeAspect="1"/>
+          </p:cNvPicPr>
+          <p:nvPr/>
+        </p:nvPicPr>
+        <p:blipFill>
+          <a:blip r:embed="rId7"/>
+          <a:stretch>
+            <a:fillRect/>
+          </a:stretch>
+        </p:blipFill>
+        <p:spPr>
+          <a:xfrm>
+            <a:off x="8919346" y="4247334"/>
+            <a:ext cx="2295525" cy="819150"/>
+          </a:xfrm>
+          <a:prstGeom prst="rect">
+            <a:avLst/>
+          </a:prstGeom>
+        </p:spPr>
+      </p:pic>
+    </p:spTree>
+    <p:extLst>
+      <p:ext uri="{BB962C8B-B14F-4D97-AF65-F5344CB8AC3E}">
+        <p14:creationId xmlns:p14="http://schemas.microsoft.com/office/powerpoint/2010/main" val="4133899180"/>
       </p:ext>
     </p:extLst>
   </p:cSld>
@@ -5126,6 +5894,154 @@
           </a:p>
         </p:txBody>
       </p:sp>
+      <p:sp>
+        <p:nvSpPr>
+          <p:cNvPr id="2" name="TextBox 1">
+            <a:extLst>
+              <a:ext uri="{FF2B5EF4-FFF2-40B4-BE49-F238E27FC236}">
+                <a16:creationId xmlns:a16="http://schemas.microsoft.com/office/drawing/2014/main" id="{ADC80B5B-3FC5-4DDB-B810-73DD45B38263}"/>
+              </a:ext>
+            </a:extLst>
+          </p:cNvPr>
+          <p:cNvSpPr txBox="1"/>
+          <p:nvPr/>
+        </p:nvSpPr>
+        <p:spPr>
+          <a:xfrm>
+            <a:off x="809897" y="1550126"/>
+            <a:ext cx="9353006" cy="6001643"/>
+          </a:xfrm>
+          <a:prstGeom prst="rect">
+            <a:avLst/>
+          </a:prstGeom>
+          <a:noFill/>
+        </p:spPr>
+        <p:txBody>
+          <a:bodyPr wrap="square" rtlCol="0">
+            <a:spAutoFit/>
+          </a:bodyPr>
+          <a:lstStyle/>
+          <a:p>
+            <a:pPr marL="285750" indent="-285750">
+              <a:buFontTx/>
+              <a:buChar char="-"/>
+            </a:pPr>
+            <a:r>
+              <a:rPr lang="en-US" sz="3200" dirty="0"/>
+              <a:t>Accelerometer (</a:t>
+            </a:r>
+            <a:r>
+              <a:rPr lang="en-US" sz="3200" dirty="0" err="1"/>
+              <a:t>x,y,z</a:t>
+            </a:r>
+            <a:r>
+              <a:rPr lang="en-US" sz="3200" dirty="0"/>
+              <a:t>) 	@ 6400hz</a:t>
+            </a:r>
+          </a:p>
+          <a:p>
+            <a:pPr marL="285750" indent="-285750">
+              <a:buFontTx/>
+              <a:buChar char="-"/>
+            </a:pPr>
+            <a:r>
+              <a:rPr lang="en-US" sz="3200" dirty="0"/>
+              <a:t>RPM 		         		@ 20hz</a:t>
+            </a:r>
+          </a:p>
+          <a:p>
+            <a:pPr marL="285750" indent="-285750">
+              <a:buFontTx/>
+              <a:buChar char="-"/>
+            </a:pPr>
+            <a:r>
+              <a:rPr lang="en-US" sz="3200" dirty="0"/>
+              <a:t>Throttle Pos			@ 20hz</a:t>
+            </a:r>
+          </a:p>
+          <a:p>
+            <a:pPr marL="285750" indent="-285750">
+              <a:buFontTx/>
+              <a:buChar char="-"/>
+            </a:pPr>
+            <a:r>
+              <a:rPr lang="en-US" sz="3200" dirty="0"/>
+              <a:t>Engine Load			@ 20hz</a:t>
+            </a:r>
+          </a:p>
+          <a:p>
+            <a:pPr marL="285750" indent="-285750">
+              <a:buFontTx/>
+              <a:buChar char="-"/>
+            </a:pPr>
+            <a:r>
+              <a:rPr lang="en-US" sz="3200" dirty="0"/>
+              <a:t>Ignition Timing		@ 20hz</a:t>
+            </a:r>
+          </a:p>
+          <a:p>
+            <a:pPr marL="285750" indent="-285750">
+              <a:buFontTx/>
+              <a:buChar char="-"/>
+            </a:pPr>
+            <a:r>
+              <a:rPr lang="en-US" sz="3200" dirty="0"/>
+              <a:t>Coolant Temp			@ 20hz</a:t>
+            </a:r>
+          </a:p>
+          <a:p>
+            <a:pPr marL="285750" indent="-285750">
+              <a:buFontTx/>
+              <a:buChar char="-"/>
+            </a:pPr>
+            <a:r>
+              <a:rPr lang="en-US" sz="3200" dirty="0"/>
+              <a:t>Inlet Air Temp			@ 20hz</a:t>
+            </a:r>
+          </a:p>
+          <a:p>
+            <a:pPr marL="285750" indent="-285750">
+              <a:buFontTx/>
+              <a:buChar char="-"/>
+            </a:pPr>
+            <a:r>
+              <a:rPr lang="en-US" sz="3200" dirty="0"/>
+              <a:t>MAP				@ 20hz</a:t>
+            </a:r>
+          </a:p>
+          <a:p>
+            <a:pPr marL="285750" indent="-285750">
+              <a:buFontTx/>
+              <a:buChar char="-"/>
+            </a:pPr>
+            <a:endParaRPr lang="en-US" sz="3200" dirty="0"/>
+          </a:p>
+          <a:p>
+            <a:pPr marL="285750" indent="-285750">
+              <a:buFontTx/>
+              <a:buChar char="-"/>
+            </a:pPr>
+            <a:r>
+              <a:rPr lang="en-US" sz="3200" dirty="0"/>
+              <a:t>FFT, DWT, Spectrogram of Accelerometer</a:t>
+            </a:r>
+          </a:p>
+          <a:p>
+            <a:pPr marL="285750" indent="-285750">
+              <a:buFontTx/>
+              <a:buChar char="-"/>
+            </a:pPr>
+            <a:endParaRPr lang="en-US" sz="3200" dirty="0"/>
+          </a:p>
+          <a:p>
+            <a:pPr marL="285750" indent="-285750">
+              <a:buFontTx/>
+              <a:buChar char="-"/>
+            </a:pPr>
+            <a:endParaRPr lang="en-US" sz="3200" dirty="0"/>
+          </a:p>
+        </p:txBody>
+      </p:sp>
     </p:spTree>
     <p:extLst>
       <p:ext uri="{BB962C8B-B14F-4D97-AF65-F5344CB8AC3E}">
@@ -5178,14 +6094,143 @@
         </p:blipFill>
         <p:spPr>
           <a:xfrm>
-            <a:off x="1752600" y="109537"/>
-            <a:ext cx="8686800" cy="6638925"/>
+            <a:off x="4905103" y="1107565"/>
+            <a:ext cx="6982097" cy="5336098"/>
           </a:xfrm>
           <a:prstGeom prst="rect">
             <a:avLst/>
           </a:prstGeom>
         </p:spPr>
       </p:pic>
+      <p:sp>
+        <p:nvSpPr>
+          <p:cNvPr id="3" name="TextBox 2">
+            <a:extLst>
+              <a:ext uri="{FF2B5EF4-FFF2-40B4-BE49-F238E27FC236}">
+                <a16:creationId xmlns:a16="http://schemas.microsoft.com/office/drawing/2014/main" id="{9FF8696B-1D19-4E37-9B61-DA620F352A8B}"/>
+              </a:ext>
+            </a:extLst>
+          </p:cNvPr>
+          <p:cNvSpPr txBox="1"/>
+          <p:nvPr/>
+        </p:nvSpPr>
+        <p:spPr>
+          <a:xfrm>
+            <a:off x="585628" y="256853"/>
+            <a:ext cx="6863136" cy="830997"/>
+          </a:xfrm>
+          <a:prstGeom prst="rect">
+            <a:avLst/>
+          </a:prstGeom>
+          <a:noFill/>
+        </p:spPr>
+        <p:txBody>
+          <a:bodyPr wrap="square" rtlCol="0">
+            <a:spAutoFit/>
+          </a:bodyPr>
+          <a:lstStyle/>
+          <a:p>
+            <a:r>
+              <a:rPr lang="en-US" sz="4800" dirty="0"/>
+              <a:t>RPM – Vibration</a:t>
+            </a:r>
+          </a:p>
+        </p:txBody>
+      </p:sp>
+      <p:sp>
+        <p:nvSpPr>
+          <p:cNvPr id="4" name="TextBox 3">
+            <a:extLst>
+              <a:ext uri="{FF2B5EF4-FFF2-40B4-BE49-F238E27FC236}">
+                <a16:creationId xmlns:a16="http://schemas.microsoft.com/office/drawing/2014/main" id="{6D366F79-6AE2-4F18-B30C-73C4ECA966B7}"/>
+              </a:ext>
+            </a:extLst>
+          </p:cNvPr>
+          <p:cNvSpPr txBox="1"/>
+          <p:nvPr/>
+        </p:nvSpPr>
+        <p:spPr>
+          <a:xfrm>
+            <a:off x="670559" y="2090057"/>
+            <a:ext cx="4188823" cy="2585323"/>
+          </a:xfrm>
+          <a:prstGeom prst="rect">
+            <a:avLst/>
+          </a:prstGeom>
+          <a:noFill/>
+        </p:spPr>
+        <p:txBody>
+          <a:bodyPr wrap="square" rtlCol="0">
+            <a:spAutoFit/>
+          </a:bodyPr>
+          <a:lstStyle/>
+          <a:p>
+            <a:r>
+              <a:rPr lang="en-US" dirty="0"/>
+              <a:t>Should create an rpm – vibration distribution after several nominal runs, would create a 1-D lookup table (fast)</a:t>
+            </a:r>
+          </a:p>
+          <a:p>
+            <a:endParaRPr lang="en-US" dirty="0"/>
+          </a:p>
+          <a:p>
+            <a:r>
+              <a:rPr lang="en-US" dirty="0"/>
+              <a:t>Would allow us to detect abnormal vibration at a given rpm</a:t>
+            </a:r>
+          </a:p>
+          <a:p>
+            <a:endParaRPr lang="en-US" dirty="0"/>
+          </a:p>
+          <a:p>
+            <a:r>
+              <a:rPr lang="en-US" dirty="0"/>
+              <a:t>Vibration is also affected by other factors (such as load)</a:t>
+            </a:r>
+          </a:p>
+        </p:txBody>
+      </p:sp>
+      <p:sp>
+        <p:nvSpPr>
+          <p:cNvPr id="5" name="TextBox 4">
+            <a:extLst>
+              <a:ext uri="{FF2B5EF4-FFF2-40B4-BE49-F238E27FC236}">
+                <a16:creationId xmlns:a16="http://schemas.microsoft.com/office/drawing/2014/main" id="{BA41009B-8839-47B6-ABF7-69AD43F9F2AF}"/>
+              </a:ext>
+            </a:extLst>
+          </p:cNvPr>
+          <p:cNvSpPr txBox="1"/>
+          <p:nvPr/>
+        </p:nvSpPr>
+        <p:spPr>
+          <a:xfrm>
+            <a:off x="409302" y="5468982"/>
+            <a:ext cx="4458789" cy="646331"/>
+          </a:xfrm>
+          <a:prstGeom prst="rect">
+            <a:avLst/>
+          </a:prstGeom>
+          <a:solidFill>
+            <a:schemeClr val="accent4">
+              <a:lumMod val="40000"/>
+              <a:lumOff val="60000"/>
+            </a:schemeClr>
+          </a:solidFill>
+        </p:spPr>
+        <p:txBody>
+          <a:bodyPr wrap="square" rtlCol="0">
+            <a:spAutoFit/>
+          </a:bodyPr>
+          <a:lstStyle/>
+          <a:p>
+            <a:pPr algn="ctr"/>
+            <a:r>
+              <a:rPr lang="en-US" dirty="0"/>
+              <a:t>Vibrations are like the fingerprint of rotating machinery – and their health!</a:t>
+            </a:r>
+          </a:p>
+        </p:txBody>
+      </p:sp>
     </p:spTree>
     <p:extLst>
       <p:ext uri="{BB962C8B-B14F-4D97-AF65-F5344CB8AC3E}">
@@ -5238,14 +6283,365 @@
         </p:blipFill>
         <p:spPr>
           <a:xfrm>
-            <a:off x="1857375" y="204787"/>
-            <a:ext cx="8477250" cy="6448425"/>
+            <a:off x="5523684" y="1712462"/>
+            <a:ext cx="6163220" cy="4688202"/>
           </a:xfrm>
           <a:prstGeom prst="rect">
             <a:avLst/>
           </a:prstGeom>
         </p:spPr>
       </p:pic>
+      <p:sp>
+        <p:nvSpPr>
+          <p:cNvPr id="3" name="TextBox 2">
+            <a:extLst>
+              <a:ext uri="{FF2B5EF4-FFF2-40B4-BE49-F238E27FC236}">
+                <a16:creationId xmlns:a16="http://schemas.microsoft.com/office/drawing/2014/main" id="{B3FE7A9F-E24E-4EF2-95C0-CB187C2A7D8A}"/>
+              </a:ext>
+            </a:extLst>
+          </p:cNvPr>
+          <p:cNvSpPr txBox="1"/>
+          <p:nvPr/>
+        </p:nvSpPr>
+        <p:spPr>
+          <a:xfrm>
+            <a:off x="585628" y="256853"/>
+            <a:ext cx="6863136" cy="830997"/>
+          </a:xfrm>
+          <a:prstGeom prst="rect">
+            <a:avLst/>
+          </a:prstGeom>
+          <a:noFill/>
+        </p:spPr>
+        <p:txBody>
+          <a:bodyPr wrap="square" rtlCol="0">
+            <a:spAutoFit/>
+          </a:bodyPr>
+          <a:lstStyle/>
+          <a:p>
+            <a:r>
+              <a:rPr lang="en-US" sz="4800" dirty="0"/>
+              <a:t>RPM – Throttle - Load</a:t>
+            </a:r>
+          </a:p>
+        </p:txBody>
+      </p:sp>
+      <p:sp>
+        <p:nvSpPr>
+          <p:cNvPr id="6" name="Rectangle 5">
+            <a:extLst>
+              <a:ext uri="{FF2B5EF4-FFF2-40B4-BE49-F238E27FC236}">
+                <a16:creationId xmlns:a16="http://schemas.microsoft.com/office/drawing/2014/main" id="{D5CD86C5-EDDA-48B5-91D7-5F315514E5EF}"/>
+              </a:ext>
+            </a:extLst>
+          </p:cNvPr>
+          <p:cNvSpPr/>
+          <p:nvPr/>
+        </p:nvSpPr>
+        <p:spPr>
+          <a:xfrm>
+            <a:off x="8882743" y="1759132"/>
+            <a:ext cx="1297577" cy="2011680"/>
+          </a:xfrm>
+          <a:prstGeom prst="rect">
+            <a:avLst/>
+          </a:prstGeom>
+          <a:noFill/>
+          <a:ln w="57150">
+            <a:solidFill>
+              <a:srgbClr val="FF0000"/>
+            </a:solidFill>
+          </a:ln>
+        </p:spPr>
+        <p:style>
+          <a:lnRef idx="2">
+            <a:schemeClr val="accent1">
+              <a:shade val="50000"/>
+            </a:schemeClr>
+          </a:lnRef>
+          <a:fillRef idx="1">
+            <a:schemeClr val="accent1"/>
+          </a:fillRef>
+          <a:effectRef idx="0">
+            <a:schemeClr val="accent1"/>
+          </a:effectRef>
+          <a:fontRef idx="minor">
+            <a:schemeClr val="lt1"/>
+          </a:fontRef>
+        </p:style>
+        <p:txBody>
+          <a:bodyPr rtlCol="0" anchor="ctr"/>
+          <a:lstStyle/>
+          <a:p>
+            <a:pPr algn="ctr"/>
+            <a:endParaRPr lang="en-US"/>
+          </a:p>
+        </p:txBody>
+      </p:sp>
+      <p:cxnSp>
+        <p:nvCxnSpPr>
+          <p:cNvPr id="8" name="Straight Arrow Connector 7">
+            <a:extLst>
+              <a:ext uri="{FF2B5EF4-FFF2-40B4-BE49-F238E27FC236}">
+                <a16:creationId xmlns:a16="http://schemas.microsoft.com/office/drawing/2014/main" id="{32FA7E7D-3F4B-4043-9B0C-19D0283483D1}"/>
+              </a:ext>
+            </a:extLst>
+          </p:cNvPr>
+          <p:cNvCxnSpPr>
+            <a:cxnSpLocks/>
+          </p:cNvCxnSpPr>
+          <p:nvPr/>
+        </p:nvCxnSpPr>
+        <p:spPr>
+          <a:xfrm>
+            <a:off x="4824549" y="2351314"/>
+            <a:ext cx="3892731" cy="182880"/>
+          </a:xfrm>
+          <a:prstGeom prst="straightConnector1">
+            <a:avLst/>
+          </a:prstGeom>
+          <a:ln w="57150">
+            <a:solidFill>
+              <a:srgbClr val="FF0000"/>
+            </a:solidFill>
+            <a:tailEnd type="triangle"/>
+          </a:ln>
+        </p:spPr>
+        <p:style>
+          <a:lnRef idx="1">
+            <a:schemeClr val="accent1"/>
+          </a:lnRef>
+          <a:fillRef idx="0">
+            <a:schemeClr val="accent1"/>
+          </a:fillRef>
+          <a:effectRef idx="0">
+            <a:schemeClr val="accent1"/>
+          </a:effectRef>
+          <a:fontRef idx="minor">
+            <a:schemeClr val="tx1"/>
+          </a:fontRef>
+        </p:style>
+      </p:cxnSp>
+      <p:sp>
+        <p:nvSpPr>
+          <p:cNvPr id="10" name="TextBox 9">
+            <a:extLst>
+              <a:ext uri="{FF2B5EF4-FFF2-40B4-BE49-F238E27FC236}">
+                <a16:creationId xmlns:a16="http://schemas.microsoft.com/office/drawing/2014/main" id="{4AEEB478-75A7-477B-9602-7004959FF856}"/>
+              </a:ext>
+            </a:extLst>
+          </p:cNvPr>
+          <p:cNvSpPr txBox="1"/>
+          <p:nvPr/>
+        </p:nvSpPr>
+        <p:spPr>
+          <a:xfrm>
+            <a:off x="574764" y="2037806"/>
+            <a:ext cx="4188823" cy="646331"/>
+          </a:xfrm>
+          <a:prstGeom prst="rect">
+            <a:avLst/>
+          </a:prstGeom>
+          <a:noFill/>
+        </p:spPr>
+        <p:txBody>
+          <a:bodyPr wrap="square" rtlCol="0">
+            <a:spAutoFit/>
+          </a:bodyPr>
+          <a:lstStyle/>
+          <a:p>
+            <a:pPr algn="r"/>
+            <a:r>
+              <a:rPr lang="en-US" dirty="0"/>
+              <a:t>RPM drops as load rises, then rises after throttle increases</a:t>
+            </a:r>
+          </a:p>
+        </p:txBody>
+      </p:sp>
+      <p:sp>
+        <p:nvSpPr>
+          <p:cNvPr id="11" name="Rectangle 10">
+            <a:extLst>
+              <a:ext uri="{FF2B5EF4-FFF2-40B4-BE49-F238E27FC236}">
+                <a16:creationId xmlns:a16="http://schemas.microsoft.com/office/drawing/2014/main" id="{33129C6F-0AF0-4059-A2C8-A028E099D370}"/>
+              </a:ext>
+            </a:extLst>
+          </p:cNvPr>
+          <p:cNvSpPr/>
+          <p:nvPr/>
+        </p:nvSpPr>
+        <p:spPr>
+          <a:xfrm>
+            <a:off x="6379030" y="4049486"/>
+            <a:ext cx="971003" cy="914399"/>
+          </a:xfrm>
+          <a:prstGeom prst="rect">
+            <a:avLst/>
+          </a:prstGeom>
+          <a:noFill/>
+          <a:ln w="57150">
+            <a:solidFill>
+              <a:srgbClr val="FF0000"/>
+            </a:solidFill>
+          </a:ln>
+        </p:spPr>
+        <p:style>
+          <a:lnRef idx="2">
+            <a:schemeClr val="accent1">
+              <a:shade val="50000"/>
+            </a:schemeClr>
+          </a:lnRef>
+          <a:fillRef idx="1">
+            <a:schemeClr val="accent1"/>
+          </a:fillRef>
+          <a:effectRef idx="0">
+            <a:schemeClr val="accent1"/>
+          </a:effectRef>
+          <a:fontRef idx="minor">
+            <a:schemeClr val="lt1"/>
+          </a:fontRef>
+        </p:style>
+        <p:txBody>
+          <a:bodyPr rtlCol="0" anchor="ctr"/>
+          <a:lstStyle/>
+          <a:p>
+            <a:pPr algn="ctr"/>
+            <a:endParaRPr lang="en-US"/>
+          </a:p>
+        </p:txBody>
+      </p:sp>
+      <p:cxnSp>
+        <p:nvCxnSpPr>
+          <p:cNvPr id="12" name="Straight Arrow Connector 11">
+            <a:extLst>
+              <a:ext uri="{FF2B5EF4-FFF2-40B4-BE49-F238E27FC236}">
+                <a16:creationId xmlns:a16="http://schemas.microsoft.com/office/drawing/2014/main" id="{C2653C7F-BE00-432C-8ED6-297D46D0D229}"/>
+              </a:ext>
+            </a:extLst>
+          </p:cNvPr>
+          <p:cNvCxnSpPr>
+            <a:cxnSpLocks/>
+          </p:cNvCxnSpPr>
+          <p:nvPr/>
+        </p:nvCxnSpPr>
+        <p:spPr>
+          <a:xfrm>
+            <a:off x="4955177" y="4441371"/>
+            <a:ext cx="1389017" cy="65314"/>
+          </a:xfrm>
+          <a:prstGeom prst="straightConnector1">
+            <a:avLst/>
+          </a:prstGeom>
+          <a:ln w="57150">
+            <a:solidFill>
+              <a:srgbClr val="FF0000"/>
+            </a:solidFill>
+            <a:tailEnd type="triangle"/>
+          </a:ln>
+        </p:spPr>
+        <p:style>
+          <a:lnRef idx="1">
+            <a:schemeClr val="accent1"/>
+          </a:lnRef>
+          <a:fillRef idx="0">
+            <a:schemeClr val="accent1"/>
+          </a:fillRef>
+          <a:effectRef idx="0">
+            <a:schemeClr val="accent1"/>
+          </a:effectRef>
+          <a:fontRef idx="minor">
+            <a:schemeClr val="tx1"/>
+          </a:fontRef>
+        </p:style>
+      </p:cxnSp>
+      <p:sp>
+        <p:nvSpPr>
+          <p:cNvPr id="14" name="TextBox 13">
+            <a:extLst>
+              <a:ext uri="{FF2B5EF4-FFF2-40B4-BE49-F238E27FC236}">
+                <a16:creationId xmlns:a16="http://schemas.microsoft.com/office/drawing/2014/main" id="{EAABCF62-57B8-43B8-8D9B-011E33CAF296}"/>
+              </a:ext>
+            </a:extLst>
+          </p:cNvPr>
+          <p:cNvSpPr txBox="1"/>
+          <p:nvPr/>
+        </p:nvSpPr>
+        <p:spPr>
+          <a:xfrm>
+            <a:off x="744581" y="4062548"/>
+            <a:ext cx="4188823" cy="646331"/>
+          </a:xfrm>
+          <a:prstGeom prst="rect">
+            <a:avLst/>
+          </a:prstGeom>
+          <a:noFill/>
+        </p:spPr>
+        <p:txBody>
+          <a:bodyPr wrap="square" rtlCol="0">
+            <a:spAutoFit/>
+          </a:bodyPr>
+          <a:lstStyle/>
+          <a:p>
+            <a:pPr algn="r"/>
+            <a:r>
+              <a:rPr lang="en-US" dirty="0"/>
+              <a:t>As throttle and load increase in lock step, RPM doesn’t change much</a:t>
+            </a:r>
+          </a:p>
+        </p:txBody>
+      </p:sp>
+      <p:sp>
+        <p:nvSpPr>
+          <p:cNvPr id="15" name="TextBox 14">
+            <a:extLst>
+              <a:ext uri="{FF2B5EF4-FFF2-40B4-BE49-F238E27FC236}">
+                <a16:creationId xmlns:a16="http://schemas.microsoft.com/office/drawing/2014/main" id="{9C38F89D-4C2C-417E-BB9B-A979AF6B3EE3}"/>
+              </a:ext>
+            </a:extLst>
+          </p:cNvPr>
+          <p:cNvSpPr txBox="1"/>
+          <p:nvPr/>
+        </p:nvSpPr>
+        <p:spPr>
+          <a:xfrm>
+            <a:off x="409302" y="5129348"/>
+            <a:ext cx="5294813" cy="1477328"/>
+          </a:xfrm>
+          <a:prstGeom prst="rect">
+            <a:avLst/>
+          </a:prstGeom>
+          <a:solidFill>
+            <a:schemeClr val="accent4">
+              <a:lumMod val="40000"/>
+              <a:lumOff val="60000"/>
+            </a:schemeClr>
+          </a:solidFill>
+        </p:spPr>
+        <p:txBody>
+          <a:bodyPr wrap="square" rtlCol="0">
+            <a:spAutoFit/>
+          </a:bodyPr>
+          <a:lstStyle/>
+          <a:p>
+            <a:pPr algn="ctr"/>
+            <a:r>
+              <a:rPr lang="en-US" dirty="0"/>
+              <a:t>What is the exact relationship between engine RPM and throttle + load? </a:t>
+            </a:r>
+          </a:p>
+          <a:p>
+            <a:pPr algn="ctr"/>
+            <a:endParaRPr lang="en-US" dirty="0"/>
+          </a:p>
+          <a:p>
+            <a:pPr algn="ctr"/>
+            <a:r>
+              <a:rPr lang="en-US" dirty="0"/>
+              <a:t>Can we derive an equation to model the relationship or is a more sophisticated approach needed?</a:t>
+            </a:r>
+          </a:p>
+        </p:txBody>
+      </p:sp>
     </p:spTree>
     <p:extLst>
       <p:ext uri="{BB962C8B-B14F-4D97-AF65-F5344CB8AC3E}">
@@ -5298,14 +6694,222 @@
         </p:blipFill>
         <p:spPr>
           <a:xfrm>
-            <a:off x="2028825" y="261937"/>
-            <a:ext cx="8134350" cy="6334125"/>
+            <a:off x="5738675" y="1846217"/>
+            <a:ext cx="6189271" cy="4819514"/>
           </a:xfrm>
           <a:prstGeom prst="rect">
             <a:avLst/>
           </a:prstGeom>
         </p:spPr>
       </p:pic>
+      <p:sp>
+        <p:nvSpPr>
+          <p:cNvPr id="3" name="Rectangle 2">
+            <a:extLst>
+              <a:ext uri="{FF2B5EF4-FFF2-40B4-BE49-F238E27FC236}">
+                <a16:creationId xmlns:a16="http://schemas.microsoft.com/office/drawing/2014/main" id="{2DAB5E84-5757-437F-9A66-C6EB64FAF2DE}"/>
+              </a:ext>
+            </a:extLst>
+          </p:cNvPr>
+          <p:cNvSpPr/>
+          <p:nvPr/>
+        </p:nvSpPr>
+        <p:spPr>
+          <a:xfrm>
+            <a:off x="9248503" y="2020389"/>
+            <a:ext cx="1506583" cy="2873828"/>
+          </a:xfrm>
+          <a:prstGeom prst="rect">
+            <a:avLst/>
+          </a:prstGeom>
+          <a:noFill/>
+          <a:ln w="57150">
+            <a:solidFill>
+              <a:srgbClr val="FF0000"/>
+            </a:solidFill>
+          </a:ln>
+        </p:spPr>
+        <p:style>
+          <a:lnRef idx="2">
+            <a:schemeClr val="accent1">
+              <a:shade val="50000"/>
+            </a:schemeClr>
+          </a:lnRef>
+          <a:fillRef idx="1">
+            <a:schemeClr val="accent1"/>
+          </a:fillRef>
+          <a:effectRef idx="0">
+            <a:schemeClr val="accent1"/>
+          </a:effectRef>
+          <a:fontRef idx="minor">
+            <a:schemeClr val="lt1"/>
+          </a:fontRef>
+        </p:style>
+        <p:txBody>
+          <a:bodyPr rtlCol="0" anchor="ctr"/>
+          <a:lstStyle/>
+          <a:p>
+            <a:pPr algn="ctr"/>
+            <a:endParaRPr lang="en-US"/>
+          </a:p>
+        </p:txBody>
+      </p:sp>
+      <p:sp>
+        <p:nvSpPr>
+          <p:cNvPr id="4" name="TextBox 3">
+            <a:extLst>
+              <a:ext uri="{FF2B5EF4-FFF2-40B4-BE49-F238E27FC236}">
+                <a16:creationId xmlns:a16="http://schemas.microsoft.com/office/drawing/2014/main" id="{AF420571-C979-4A53-B277-B9AF502862EE}"/>
+              </a:ext>
+            </a:extLst>
+          </p:cNvPr>
+          <p:cNvSpPr txBox="1"/>
+          <p:nvPr/>
+        </p:nvSpPr>
+        <p:spPr>
+          <a:xfrm>
+            <a:off x="585628" y="256853"/>
+            <a:ext cx="6863136" cy="830997"/>
+          </a:xfrm>
+          <a:prstGeom prst="rect">
+            <a:avLst/>
+          </a:prstGeom>
+          <a:noFill/>
+        </p:spPr>
+        <p:txBody>
+          <a:bodyPr wrap="square" rtlCol="0">
+            <a:spAutoFit/>
+          </a:bodyPr>
+          <a:lstStyle/>
+          <a:p>
+            <a:r>
+              <a:rPr lang="en-US" sz="4800" dirty="0"/>
+              <a:t>RPM – Ignition Timing</a:t>
+            </a:r>
+          </a:p>
+        </p:txBody>
+      </p:sp>
+      <p:sp>
+        <p:nvSpPr>
+          <p:cNvPr id="5" name="TextBox 4">
+            <a:extLst>
+              <a:ext uri="{FF2B5EF4-FFF2-40B4-BE49-F238E27FC236}">
+                <a16:creationId xmlns:a16="http://schemas.microsoft.com/office/drawing/2014/main" id="{646A66A1-D358-419C-91A9-53EF36F67491}"/>
+              </a:ext>
+            </a:extLst>
+          </p:cNvPr>
+          <p:cNvSpPr txBox="1"/>
+          <p:nvPr/>
+        </p:nvSpPr>
+        <p:spPr>
+          <a:xfrm>
+            <a:off x="574764" y="2037806"/>
+            <a:ext cx="4188823" cy="369332"/>
+          </a:xfrm>
+          <a:prstGeom prst="rect">
+            <a:avLst/>
+          </a:prstGeom>
+          <a:noFill/>
+        </p:spPr>
+        <p:txBody>
+          <a:bodyPr wrap="square" rtlCol="0">
+            <a:spAutoFit/>
+          </a:bodyPr>
+          <a:lstStyle/>
+          <a:p>
+            <a:pPr algn="r"/>
+            <a:r>
+              <a:rPr lang="en-US" dirty="0"/>
+              <a:t>As RPM decreases, so does the timing</a:t>
+            </a:r>
+          </a:p>
+        </p:txBody>
+      </p:sp>
+      <p:cxnSp>
+        <p:nvCxnSpPr>
+          <p:cNvPr id="6" name="Straight Arrow Connector 5">
+            <a:extLst>
+              <a:ext uri="{FF2B5EF4-FFF2-40B4-BE49-F238E27FC236}">
+                <a16:creationId xmlns:a16="http://schemas.microsoft.com/office/drawing/2014/main" id="{27E1AD71-F0A6-443E-9823-8B0CF278A5CE}"/>
+              </a:ext>
+            </a:extLst>
+          </p:cNvPr>
+          <p:cNvCxnSpPr>
+            <a:cxnSpLocks/>
+          </p:cNvCxnSpPr>
+          <p:nvPr/>
+        </p:nvCxnSpPr>
+        <p:spPr>
+          <a:xfrm>
+            <a:off x="4824549" y="2351314"/>
+            <a:ext cx="3892731" cy="182880"/>
+          </a:xfrm>
+          <a:prstGeom prst="straightConnector1">
+            <a:avLst/>
+          </a:prstGeom>
+          <a:ln w="57150">
+            <a:solidFill>
+              <a:srgbClr val="FF0000"/>
+            </a:solidFill>
+            <a:tailEnd type="triangle"/>
+          </a:ln>
+        </p:spPr>
+        <p:style>
+          <a:lnRef idx="1">
+            <a:schemeClr val="accent1"/>
+          </a:lnRef>
+          <a:fillRef idx="0">
+            <a:schemeClr val="accent1"/>
+          </a:fillRef>
+          <a:effectRef idx="0">
+            <a:schemeClr val="accent1"/>
+          </a:effectRef>
+          <a:fontRef idx="minor">
+            <a:schemeClr val="tx1"/>
+          </a:fontRef>
+        </p:style>
+      </p:cxnSp>
+      <p:sp>
+        <p:nvSpPr>
+          <p:cNvPr id="7" name="TextBox 6">
+            <a:extLst>
+              <a:ext uri="{FF2B5EF4-FFF2-40B4-BE49-F238E27FC236}">
+                <a16:creationId xmlns:a16="http://schemas.microsoft.com/office/drawing/2014/main" id="{2A761ABE-42A1-4D2B-B527-10916101F6F6}"/>
+              </a:ext>
+            </a:extLst>
+          </p:cNvPr>
+          <p:cNvSpPr txBox="1"/>
+          <p:nvPr/>
+        </p:nvSpPr>
+        <p:spPr>
+          <a:xfrm>
+            <a:off x="727164" y="4846320"/>
+            <a:ext cx="4188823" cy="646331"/>
+          </a:xfrm>
+          <a:prstGeom prst="rect">
+            <a:avLst/>
+          </a:prstGeom>
+          <a:solidFill>
+            <a:schemeClr val="accent4">
+              <a:lumMod val="40000"/>
+              <a:lumOff val="60000"/>
+            </a:schemeClr>
+          </a:solidFill>
+        </p:spPr>
+        <p:txBody>
+          <a:bodyPr wrap="square" rtlCol="0">
+            <a:spAutoFit/>
+          </a:bodyPr>
+          <a:lstStyle/>
+          <a:p>
+            <a:pPr algn="ctr"/>
+            <a:r>
+              <a:rPr lang="en-US" dirty="0"/>
+              <a:t>How is knowledge of this relationship useful to us?</a:t>
+            </a:r>
+          </a:p>
+        </p:txBody>
+      </p:sp>
     </p:spTree>
     <p:extLst>
       <p:ext uri="{BB962C8B-B14F-4D97-AF65-F5344CB8AC3E}">
@@ -5358,14 +6962,211 @@
         </p:blipFill>
         <p:spPr>
           <a:xfrm>
-            <a:off x="2214562" y="333375"/>
-            <a:ext cx="7762875" cy="6191250"/>
+            <a:off x="4975179" y="1018904"/>
+            <a:ext cx="6815977" cy="5436054"/>
           </a:xfrm>
           <a:prstGeom prst="rect">
             <a:avLst/>
           </a:prstGeom>
         </p:spPr>
       </p:pic>
+      <p:sp>
+        <p:nvSpPr>
+          <p:cNvPr id="3" name="TextBox 2">
+            <a:extLst>
+              <a:ext uri="{FF2B5EF4-FFF2-40B4-BE49-F238E27FC236}">
+                <a16:creationId xmlns:a16="http://schemas.microsoft.com/office/drawing/2014/main" id="{611AB602-06E5-4716-94D4-6656B205A205}"/>
+              </a:ext>
+            </a:extLst>
+          </p:cNvPr>
+          <p:cNvSpPr txBox="1"/>
+          <p:nvPr/>
+        </p:nvSpPr>
+        <p:spPr>
+          <a:xfrm>
+            <a:off x="585628" y="256853"/>
+            <a:ext cx="6863136" cy="830997"/>
+          </a:xfrm>
+          <a:prstGeom prst="rect">
+            <a:avLst/>
+          </a:prstGeom>
+          <a:noFill/>
+        </p:spPr>
+        <p:txBody>
+          <a:bodyPr wrap="square" rtlCol="0">
+            <a:spAutoFit/>
+          </a:bodyPr>
+          <a:lstStyle/>
+          <a:p>
+            <a:r>
+              <a:rPr lang="en-US" sz="4800" dirty="0"/>
+              <a:t>Raw acceleration</a:t>
+            </a:r>
+          </a:p>
+        </p:txBody>
+      </p:sp>
+      <p:sp>
+        <p:nvSpPr>
+          <p:cNvPr id="4" name="TextBox 3">
+            <a:extLst>
+              <a:ext uri="{FF2B5EF4-FFF2-40B4-BE49-F238E27FC236}">
+                <a16:creationId xmlns:a16="http://schemas.microsoft.com/office/drawing/2014/main" id="{813E7FAC-722A-413C-94C2-3BD58DD54FAC}"/>
+              </a:ext>
+            </a:extLst>
+          </p:cNvPr>
+          <p:cNvSpPr txBox="1"/>
+          <p:nvPr/>
+        </p:nvSpPr>
+        <p:spPr>
+          <a:xfrm>
+            <a:off x="574764" y="2838995"/>
+            <a:ext cx="4188823" cy="923330"/>
+          </a:xfrm>
+          <a:prstGeom prst="rect">
+            <a:avLst/>
+          </a:prstGeom>
+          <a:solidFill>
+            <a:schemeClr val="accent4">
+              <a:lumMod val="40000"/>
+              <a:lumOff val="60000"/>
+            </a:schemeClr>
+          </a:solidFill>
+        </p:spPr>
+        <p:txBody>
+          <a:bodyPr wrap="square" rtlCol="0">
+            <a:spAutoFit/>
+          </a:bodyPr>
+          <a:lstStyle/>
+          <a:p>
+            <a:pPr algn="ctr"/>
+            <a:r>
+              <a:rPr lang="en-US" dirty="0"/>
+              <a:t>We believe the units are in V, and at 100mV/G this engines peak vibration during testing was &gt; 4g</a:t>
+            </a:r>
+          </a:p>
+        </p:txBody>
+      </p:sp>
+      <p:sp>
+        <p:nvSpPr>
+          <p:cNvPr id="6" name="TextBox 5">
+            <a:extLst>
+              <a:ext uri="{FF2B5EF4-FFF2-40B4-BE49-F238E27FC236}">
+                <a16:creationId xmlns:a16="http://schemas.microsoft.com/office/drawing/2014/main" id="{8A4D0B81-2274-4D97-869F-1E371467C982}"/>
+              </a:ext>
+            </a:extLst>
+          </p:cNvPr>
+          <p:cNvSpPr txBox="1"/>
+          <p:nvPr/>
+        </p:nvSpPr>
+        <p:spPr>
+          <a:xfrm rot="16200000">
+            <a:off x="4659086" y="1837509"/>
+            <a:ext cx="647870" cy="369332"/>
+          </a:xfrm>
+          <a:prstGeom prst="rect">
+            <a:avLst/>
+          </a:prstGeom>
+          <a:solidFill>
+            <a:schemeClr val="accent6">
+              <a:lumMod val="40000"/>
+              <a:lumOff val="60000"/>
+            </a:schemeClr>
+          </a:solidFill>
+        </p:spPr>
+        <p:txBody>
+          <a:bodyPr wrap="none" rtlCol="0">
+            <a:spAutoFit/>
+          </a:bodyPr>
+          <a:lstStyle/>
+          <a:p>
+            <a:r>
+              <a:rPr lang="en-US" dirty="0"/>
+              <a:t>Volts</a:t>
+            </a:r>
+          </a:p>
+        </p:txBody>
+      </p:sp>
+      <p:sp>
+        <p:nvSpPr>
+          <p:cNvPr id="7" name="TextBox 6">
+            <a:extLst>
+              <a:ext uri="{FF2B5EF4-FFF2-40B4-BE49-F238E27FC236}">
+                <a16:creationId xmlns:a16="http://schemas.microsoft.com/office/drawing/2014/main" id="{001808E8-F82B-4F79-9B66-468ED1089AC6}"/>
+              </a:ext>
+            </a:extLst>
+          </p:cNvPr>
+          <p:cNvSpPr txBox="1"/>
+          <p:nvPr/>
+        </p:nvSpPr>
+        <p:spPr>
+          <a:xfrm>
+            <a:off x="5638801" y="2825931"/>
+            <a:ext cx="940963" cy="369332"/>
+          </a:xfrm>
+          <a:prstGeom prst="rect">
+            <a:avLst/>
+          </a:prstGeom>
+          <a:solidFill>
+            <a:schemeClr val="accent6">
+              <a:lumMod val="40000"/>
+              <a:lumOff val="60000"/>
+            </a:schemeClr>
+          </a:solidFill>
+        </p:spPr>
+        <p:txBody>
+          <a:bodyPr wrap="none" rtlCol="0">
+            <a:spAutoFit/>
+          </a:bodyPr>
+          <a:lstStyle/>
+          <a:p>
+            <a:r>
+              <a:rPr lang="en-US" dirty="0"/>
+              <a:t>seconds</a:t>
+            </a:r>
+          </a:p>
+        </p:txBody>
+      </p:sp>
+      <p:sp>
+        <p:nvSpPr>
+          <p:cNvPr id="8" name="TextBox 7">
+            <a:extLst>
+              <a:ext uri="{FF2B5EF4-FFF2-40B4-BE49-F238E27FC236}">
+                <a16:creationId xmlns:a16="http://schemas.microsoft.com/office/drawing/2014/main" id="{9D002212-3633-4C3A-8C73-70E92AC9EBB9}"/>
+              </a:ext>
+            </a:extLst>
+          </p:cNvPr>
+          <p:cNvSpPr txBox="1"/>
+          <p:nvPr/>
+        </p:nvSpPr>
+        <p:spPr>
+          <a:xfrm>
+            <a:off x="387530" y="5020491"/>
+            <a:ext cx="4188823" cy="369332"/>
+          </a:xfrm>
+          <a:prstGeom prst="rect">
+            <a:avLst/>
+          </a:prstGeom>
+          <a:solidFill>
+            <a:schemeClr val="accent4">
+              <a:lumMod val="40000"/>
+              <a:lumOff val="60000"/>
+            </a:schemeClr>
+          </a:solidFill>
+        </p:spPr>
+        <p:txBody>
+          <a:bodyPr wrap="square" rtlCol="0">
+            <a:spAutoFit/>
+          </a:bodyPr>
+          <a:lstStyle/>
+          <a:p>
+            <a:pPr algn="ctr"/>
+            <a:r>
+              <a:rPr lang="en-US" dirty="0"/>
+              <a:t>Is this a valid assumption?</a:t>
+            </a:r>
+          </a:p>
+        </p:txBody>
+      </p:sp>
     </p:spTree>
     <p:extLst>
       <p:ext uri="{BB962C8B-B14F-4D97-AF65-F5344CB8AC3E}">
@@ -5401,7 +7202,7 @@
           <p:cNvPr id="2" name="Picture 1">
             <a:extLst>
               <a:ext uri="{FF2B5EF4-FFF2-40B4-BE49-F238E27FC236}">
-                <a16:creationId xmlns:a16="http://schemas.microsoft.com/office/drawing/2014/main" id="{C0616BAD-69B8-4A81-A044-FF848CDA8BF8}"/>
+                <a16:creationId xmlns:a16="http://schemas.microsoft.com/office/drawing/2014/main" id="{52B0C0E9-AF05-4A71-BE88-640B98519621}"/>
               </a:ext>
             </a:extLst>
           </p:cNvPr>
@@ -5418,18 +7219,426 @@
         </p:blipFill>
         <p:spPr>
           <a:xfrm>
-            <a:off x="2276475" y="609600"/>
-            <a:ext cx="7639050" cy="5638800"/>
-          </a:xfrm>
-          <a:prstGeom prst="rect">
-            <a:avLst/>
-          </a:prstGeom>
+            <a:off x="85512" y="1148987"/>
+            <a:ext cx="3970120" cy="3180767"/>
+          </a:xfrm>
+          <a:prstGeom prst="rect">
+            <a:avLst/>
+          </a:prstGeom>
+        </p:spPr>
+      </p:pic>
+      <p:pic>
+        <p:nvPicPr>
+          <p:cNvPr id="3" name="Picture 2">
+            <a:extLst>
+              <a:ext uri="{FF2B5EF4-FFF2-40B4-BE49-F238E27FC236}">
+                <a16:creationId xmlns:a16="http://schemas.microsoft.com/office/drawing/2014/main" id="{A6019D48-315D-4119-B7C0-DEA59E3CA373}"/>
+              </a:ext>
+            </a:extLst>
+          </p:cNvPr>
+          <p:cNvPicPr>
+            <a:picLocks noChangeAspect="1"/>
+          </p:cNvPicPr>
+          <p:nvPr/>
+        </p:nvPicPr>
+        <p:blipFill>
+          <a:blip r:embed="rId3"/>
+          <a:stretch>
+            <a:fillRect/>
+          </a:stretch>
+        </p:blipFill>
+        <p:spPr>
+          <a:xfrm>
+            <a:off x="3962401" y="1158985"/>
+            <a:ext cx="3886047" cy="3166755"/>
+          </a:xfrm>
+          <a:prstGeom prst="rect">
+            <a:avLst/>
+          </a:prstGeom>
+        </p:spPr>
+      </p:pic>
+      <p:pic>
+        <p:nvPicPr>
+          <p:cNvPr id="4" name="Picture 3">
+            <a:extLst>
+              <a:ext uri="{FF2B5EF4-FFF2-40B4-BE49-F238E27FC236}">
+                <a16:creationId xmlns:a16="http://schemas.microsoft.com/office/drawing/2014/main" id="{93A91D63-BFFF-4DD5-B98D-550F7CCE1BA6}"/>
+              </a:ext>
+            </a:extLst>
+          </p:cNvPr>
+          <p:cNvPicPr>
+            <a:picLocks noChangeAspect="1"/>
+          </p:cNvPicPr>
+          <p:nvPr/>
+        </p:nvPicPr>
+        <p:blipFill>
+          <a:blip r:embed="rId4"/>
+          <a:stretch>
+            <a:fillRect/>
+          </a:stretch>
+        </p:blipFill>
+        <p:spPr>
+          <a:xfrm>
+            <a:off x="7816226" y="1179993"/>
+            <a:ext cx="3834669" cy="3190108"/>
+          </a:xfrm>
+          <a:prstGeom prst="rect">
+            <a:avLst/>
+          </a:prstGeom>
+        </p:spPr>
+      </p:pic>
+      <p:sp>
+        <p:nvSpPr>
+          <p:cNvPr id="5" name="TextBox 4">
+            <a:extLst>
+              <a:ext uri="{FF2B5EF4-FFF2-40B4-BE49-F238E27FC236}">
+                <a16:creationId xmlns:a16="http://schemas.microsoft.com/office/drawing/2014/main" id="{7D999ADA-0819-4DFC-92C8-7E96829943E0}"/>
+              </a:ext>
+            </a:extLst>
+          </p:cNvPr>
+          <p:cNvSpPr txBox="1"/>
+          <p:nvPr/>
+        </p:nvSpPr>
+        <p:spPr>
+          <a:xfrm>
+            <a:off x="585628" y="256853"/>
+            <a:ext cx="6863136" cy="830997"/>
+          </a:xfrm>
+          <a:prstGeom prst="rect">
+            <a:avLst/>
+          </a:prstGeom>
+          <a:noFill/>
+        </p:spPr>
+        <p:txBody>
+          <a:bodyPr wrap="square" rtlCol="0">
+            <a:spAutoFit/>
+          </a:bodyPr>
+          <a:lstStyle/>
+          <a:p>
+            <a:r>
+              <a:rPr lang="en-US" sz="4800" dirty="0"/>
+              <a:t>Vibration Power Spectrum</a:t>
+            </a:r>
+          </a:p>
+        </p:txBody>
+      </p:sp>
+      <p:sp>
+        <p:nvSpPr>
+          <p:cNvPr id="6" name="TextBox 5">
+            <a:extLst>
+              <a:ext uri="{FF2B5EF4-FFF2-40B4-BE49-F238E27FC236}">
+                <a16:creationId xmlns:a16="http://schemas.microsoft.com/office/drawing/2014/main" id="{9EF490D6-7418-46E8-A872-A74683C8DD9E}"/>
+              </a:ext>
+            </a:extLst>
+          </p:cNvPr>
+          <p:cNvSpPr txBox="1"/>
+          <p:nvPr/>
+        </p:nvSpPr>
+        <p:spPr>
+          <a:xfrm>
+            <a:off x="191587" y="4441373"/>
+            <a:ext cx="3135087" cy="646331"/>
+          </a:xfrm>
+          <a:prstGeom prst="rect">
+            <a:avLst/>
+          </a:prstGeom>
+          <a:noFill/>
+        </p:spPr>
+        <p:txBody>
+          <a:bodyPr wrap="square" rtlCol="0">
+            <a:spAutoFit/>
+          </a:bodyPr>
+          <a:lstStyle/>
+          <a:p>
+            <a:pPr algn="ctr"/>
+            <a:r>
+              <a:rPr lang="en-US" dirty="0"/>
+              <a:t>Large presence of a 2500hz vibration in the X direction</a:t>
+            </a:r>
+          </a:p>
+        </p:txBody>
+      </p:sp>
+      <p:sp>
+        <p:nvSpPr>
+          <p:cNvPr id="7" name="Oval 6">
+            <a:extLst>
+              <a:ext uri="{FF2B5EF4-FFF2-40B4-BE49-F238E27FC236}">
+                <a16:creationId xmlns:a16="http://schemas.microsoft.com/office/drawing/2014/main" id="{84496A5C-1609-4211-8F1E-66976EC9C9F0}"/>
+              </a:ext>
+            </a:extLst>
+          </p:cNvPr>
+          <p:cNvSpPr/>
+          <p:nvPr/>
+        </p:nvSpPr>
+        <p:spPr>
+          <a:xfrm>
+            <a:off x="2272937" y="2908663"/>
+            <a:ext cx="1114697" cy="1402080"/>
+          </a:xfrm>
+          <a:prstGeom prst="ellipse">
+            <a:avLst/>
+          </a:prstGeom>
+          <a:noFill/>
+          <a:ln w="57150">
+            <a:solidFill>
+              <a:srgbClr val="FF0000"/>
+            </a:solidFill>
+          </a:ln>
+        </p:spPr>
+        <p:style>
+          <a:lnRef idx="2">
+            <a:schemeClr val="accent1">
+              <a:shade val="50000"/>
+            </a:schemeClr>
+          </a:lnRef>
+          <a:fillRef idx="1">
+            <a:schemeClr val="accent1"/>
+          </a:fillRef>
+          <a:effectRef idx="0">
+            <a:schemeClr val="accent1"/>
+          </a:effectRef>
+          <a:fontRef idx="minor">
+            <a:schemeClr val="lt1"/>
+          </a:fontRef>
+        </p:style>
+        <p:txBody>
+          <a:bodyPr rtlCol="0" anchor="ctr"/>
+          <a:lstStyle/>
+          <a:p>
+            <a:pPr algn="ctr"/>
+            <a:endParaRPr lang="en-US"/>
+          </a:p>
+        </p:txBody>
+      </p:sp>
+      <p:sp>
+        <p:nvSpPr>
+          <p:cNvPr id="8" name="Oval 7">
+            <a:extLst>
+              <a:ext uri="{FF2B5EF4-FFF2-40B4-BE49-F238E27FC236}">
+                <a16:creationId xmlns:a16="http://schemas.microsoft.com/office/drawing/2014/main" id="{035EE1FE-97F2-4665-9B10-411A9E229A97}"/>
+              </a:ext>
+            </a:extLst>
+          </p:cNvPr>
+          <p:cNvSpPr/>
+          <p:nvPr/>
+        </p:nvSpPr>
+        <p:spPr>
+          <a:xfrm>
+            <a:off x="3888377" y="1867988"/>
+            <a:ext cx="1114697" cy="1402080"/>
+          </a:xfrm>
+          <a:prstGeom prst="ellipse">
+            <a:avLst/>
+          </a:prstGeom>
+          <a:noFill/>
+          <a:ln w="57150">
+            <a:solidFill>
+              <a:srgbClr val="FF0000"/>
+            </a:solidFill>
+          </a:ln>
+        </p:spPr>
+        <p:style>
+          <a:lnRef idx="2">
+            <a:schemeClr val="accent1">
+              <a:shade val="50000"/>
+            </a:schemeClr>
+          </a:lnRef>
+          <a:fillRef idx="1">
+            <a:schemeClr val="accent1"/>
+          </a:fillRef>
+          <a:effectRef idx="0">
+            <a:schemeClr val="accent1"/>
+          </a:effectRef>
+          <a:fontRef idx="minor">
+            <a:schemeClr val="lt1"/>
+          </a:fontRef>
+        </p:style>
+        <p:txBody>
+          <a:bodyPr rtlCol="0" anchor="ctr"/>
+          <a:lstStyle/>
+          <a:p>
+            <a:pPr algn="ctr"/>
+            <a:endParaRPr lang="en-US"/>
+          </a:p>
+        </p:txBody>
+      </p:sp>
+      <p:sp>
+        <p:nvSpPr>
+          <p:cNvPr id="9" name="Oval 8">
+            <a:extLst>
+              <a:ext uri="{FF2B5EF4-FFF2-40B4-BE49-F238E27FC236}">
+                <a16:creationId xmlns:a16="http://schemas.microsoft.com/office/drawing/2014/main" id="{8FE99D13-CC16-4A79-9888-F5559892B276}"/>
+              </a:ext>
+            </a:extLst>
+          </p:cNvPr>
+          <p:cNvSpPr/>
+          <p:nvPr/>
+        </p:nvSpPr>
+        <p:spPr>
+          <a:xfrm>
+            <a:off x="7837714" y="809897"/>
+            <a:ext cx="1114697" cy="2743200"/>
+          </a:xfrm>
+          <a:prstGeom prst="ellipse">
+            <a:avLst/>
+          </a:prstGeom>
+          <a:noFill/>
+          <a:ln w="57150">
+            <a:solidFill>
+              <a:srgbClr val="FF0000"/>
+            </a:solidFill>
+          </a:ln>
+        </p:spPr>
+        <p:style>
+          <a:lnRef idx="2">
+            <a:schemeClr val="accent1">
+              <a:shade val="50000"/>
+            </a:schemeClr>
+          </a:lnRef>
+          <a:fillRef idx="1">
+            <a:schemeClr val="accent1"/>
+          </a:fillRef>
+          <a:effectRef idx="0">
+            <a:schemeClr val="accent1"/>
+          </a:effectRef>
+          <a:fontRef idx="minor">
+            <a:schemeClr val="lt1"/>
+          </a:fontRef>
+        </p:style>
+        <p:txBody>
+          <a:bodyPr rtlCol="0" anchor="ctr"/>
+          <a:lstStyle/>
+          <a:p>
+            <a:pPr algn="ctr"/>
+            <a:endParaRPr lang="en-US"/>
+          </a:p>
+        </p:txBody>
+      </p:sp>
+      <p:sp>
+        <p:nvSpPr>
+          <p:cNvPr id="10" name="TextBox 9">
+            <a:extLst>
+              <a:ext uri="{FF2B5EF4-FFF2-40B4-BE49-F238E27FC236}">
+                <a16:creationId xmlns:a16="http://schemas.microsoft.com/office/drawing/2014/main" id="{40C04A83-25CD-49B1-BA3C-03A09B782E78}"/>
+              </a:ext>
+            </a:extLst>
+          </p:cNvPr>
+          <p:cNvSpPr txBox="1"/>
+          <p:nvPr/>
+        </p:nvSpPr>
+        <p:spPr>
+          <a:xfrm>
+            <a:off x="4628605" y="4376059"/>
+            <a:ext cx="5830390" cy="369332"/>
+          </a:xfrm>
+          <a:prstGeom prst="rect">
+            <a:avLst/>
+          </a:prstGeom>
+          <a:noFill/>
+        </p:spPr>
+        <p:txBody>
+          <a:bodyPr wrap="square" rtlCol="0">
+            <a:spAutoFit/>
+          </a:bodyPr>
+          <a:lstStyle/>
+          <a:p>
+            <a:pPr algn="ctr"/>
+            <a:r>
+              <a:rPr lang="en-US" dirty="0"/>
+              <a:t>Large presence of low frequency, &lt; 200hz in all of them</a:t>
+            </a:r>
+          </a:p>
+        </p:txBody>
+      </p:sp>
+      <p:sp>
+        <p:nvSpPr>
+          <p:cNvPr id="11" name="TextBox 10">
+            <a:extLst>
+              <a:ext uri="{FF2B5EF4-FFF2-40B4-BE49-F238E27FC236}">
+                <a16:creationId xmlns:a16="http://schemas.microsoft.com/office/drawing/2014/main" id="{B8C10D7E-93FC-476E-AE6D-0C85B0DE5E02}"/>
+              </a:ext>
+            </a:extLst>
+          </p:cNvPr>
+          <p:cNvSpPr txBox="1"/>
+          <p:nvPr/>
+        </p:nvSpPr>
+        <p:spPr>
+          <a:xfrm>
+            <a:off x="5486398" y="5521237"/>
+            <a:ext cx="5830390" cy="646331"/>
+          </a:xfrm>
+          <a:prstGeom prst="rect">
+            <a:avLst/>
+          </a:prstGeom>
+          <a:solidFill>
+            <a:schemeClr val="accent4">
+              <a:lumMod val="40000"/>
+              <a:lumOff val="60000"/>
+            </a:schemeClr>
+          </a:solidFill>
+        </p:spPr>
+        <p:txBody>
+          <a:bodyPr wrap="square" rtlCol="0">
+            <a:spAutoFit/>
+          </a:bodyPr>
+          <a:lstStyle/>
+          <a:p>
+            <a:pPr algn="ctr"/>
+            <a:r>
+              <a:rPr lang="en-US" dirty="0"/>
+              <a:t>Need to generate a dataset of power spectrums at specific RPM values</a:t>
+            </a:r>
+          </a:p>
+        </p:txBody>
+      </p:sp>
+      <p:pic>
+        <p:nvPicPr>
+          <p:cNvPr id="12" name="Picture 11">
+            <a:extLst>
+              <a:ext uri="{FF2B5EF4-FFF2-40B4-BE49-F238E27FC236}">
+                <a16:creationId xmlns:a16="http://schemas.microsoft.com/office/drawing/2014/main" id="{DB6EF2DF-E153-43D9-9E65-A7D8A7A2C234}"/>
+              </a:ext>
+            </a:extLst>
+          </p:cNvPr>
+          <p:cNvPicPr>
+            <a:picLocks noChangeAspect="1"/>
+          </p:cNvPicPr>
+          <p:nvPr/>
+        </p:nvPicPr>
+        <p:blipFill>
+          <a:blip r:embed="rId5"/>
+          <a:stretch>
+            <a:fillRect/>
+          </a:stretch>
+        </p:blipFill>
+        <p:spPr>
+          <a:xfrm>
+            <a:off x="679268" y="5261609"/>
+            <a:ext cx="4267200" cy="1333500"/>
+          </a:xfrm>
+          <a:prstGeom prst="rect">
+            <a:avLst/>
+          </a:prstGeom>
+          <a:ln w="38100" cap="sq">
+            <a:solidFill>
+              <a:srgbClr val="000000"/>
+            </a:solidFill>
+            <a:prstDash val="solid"/>
+            <a:miter lim="800000"/>
+          </a:ln>
+          <a:effectLst>
+            <a:outerShdw blurRad="50800" dist="38100" dir="2700000" algn="tl" rotWithShape="0">
+              <a:srgbClr val="000000">
+                <a:alpha val="43000"/>
+              </a:srgbClr>
+            </a:outerShdw>
+          </a:effectLst>
         </p:spPr>
       </p:pic>
     </p:spTree>
     <p:extLst>
       <p:ext uri="{BB962C8B-B14F-4D97-AF65-F5344CB8AC3E}">
-        <p14:creationId xmlns:p14="http://schemas.microsoft.com/office/powerpoint/2010/main" val="640113560"/>
+        <p14:creationId xmlns:p14="http://schemas.microsoft.com/office/powerpoint/2010/main" val="2861383383"/>
       </p:ext>
     </p:extLst>
   </p:cSld>

</xml_diff>